<commit_message>
Dynamic Event Handlers Added
</commit_message>
<xml_diff>
--- a/Presentation1.pptx
+++ b/Presentation1.pptx
@@ -5,8 +5,8 @@
     <p:sldMasterId id="2147483648" r:id="rId4"/>
   </p:sldMasterIdLst>
   <p:sldIdLst>
-    <p:sldId id="256" r:id="rId5"/>
-    <p:sldId id="257" r:id="rId6"/>
+    <p:sldId id="258" r:id="rId5"/>
+    <p:sldId id="259" r:id="rId6"/>
   </p:sldIdLst>
   <p:sldSz cx="12192000" cy="6858000"/>
   <p:notesSz cx="6858000" cy="9144000"/>
@@ -260,7 +260,7 @@
           <a:p>
             <a:fld id="{15D61805-E289-435F-9A60-4C8AC6F348D4}" type="datetimeFigureOut">
               <a:rPr lang="en-US" smtClean="0"/>
-              <a:t>5/9/2022</a:t>
+              <a:t>5/12/2022</a:t>
             </a:fld>
             <a:endParaRPr lang="en-US"/>
           </a:p>
@@ -458,7 +458,7 @@
           <a:p>
             <a:fld id="{15D61805-E289-435F-9A60-4C8AC6F348D4}" type="datetimeFigureOut">
               <a:rPr lang="en-US" smtClean="0"/>
-              <a:t>5/9/2022</a:t>
+              <a:t>5/12/2022</a:t>
             </a:fld>
             <a:endParaRPr lang="en-US"/>
           </a:p>
@@ -666,7 +666,7 @@
           <a:p>
             <a:fld id="{15D61805-E289-435F-9A60-4C8AC6F348D4}" type="datetimeFigureOut">
               <a:rPr lang="en-US" smtClean="0"/>
-              <a:t>5/9/2022</a:t>
+              <a:t>5/12/2022</a:t>
             </a:fld>
             <a:endParaRPr lang="en-US"/>
           </a:p>
@@ -864,7 +864,7 @@
           <a:p>
             <a:fld id="{15D61805-E289-435F-9A60-4C8AC6F348D4}" type="datetimeFigureOut">
               <a:rPr lang="en-US" smtClean="0"/>
-              <a:t>5/9/2022</a:t>
+              <a:t>5/12/2022</a:t>
             </a:fld>
             <a:endParaRPr lang="en-US"/>
           </a:p>
@@ -1139,7 +1139,7 @@
           <a:p>
             <a:fld id="{15D61805-E289-435F-9A60-4C8AC6F348D4}" type="datetimeFigureOut">
               <a:rPr lang="en-US" smtClean="0"/>
-              <a:t>5/9/2022</a:t>
+              <a:t>5/12/2022</a:t>
             </a:fld>
             <a:endParaRPr lang="en-US"/>
           </a:p>
@@ -1404,7 +1404,7 @@
           <a:p>
             <a:fld id="{15D61805-E289-435F-9A60-4C8AC6F348D4}" type="datetimeFigureOut">
               <a:rPr lang="en-US" smtClean="0"/>
-              <a:t>5/9/2022</a:t>
+              <a:t>5/12/2022</a:t>
             </a:fld>
             <a:endParaRPr lang="en-US"/>
           </a:p>
@@ -1816,7 +1816,7 @@
           <a:p>
             <a:fld id="{15D61805-E289-435F-9A60-4C8AC6F348D4}" type="datetimeFigureOut">
               <a:rPr lang="en-US" smtClean="0"/>
-              <a:t>5/9/2022</a:t>
+              <a:t>5/12/2022</a:t>
             </a:fld>
             <a:endParaRPr lang="en-US"/>
           </a:p>
@@ -1957,7 +1957,7 @@
           <a:p>
             <a:fld id="{15D61805-E289-435F-9A60-4C8AC6F348D4}" type="datetimeFigureOut">
               <a:rPr lang="en-US" smtClean="0"/>
-              <a:t>5/9/2022</a:t>
+              <a:t>5/12/2022</a:t>
             </a:fld>
             <a:endParaRPr lang="en-US"/>
           </a:p>
@@ -2070,7 +2070,7 @@
           <a:p>
             <a:fld id="{15D61805-E289-435F-9A60-4C8AC6F348D4}" type="datetimeFigureOut">
               <a:rPr lang="en-US" smtClean="0"/>
-              <a:t>5/9/2022</a:t>
+              <a:t>5/12/2022</a:t>
             </a:fld>
             <a:endParaRPr lang="en-US"/>
           </a:p>
@@ -2381,7 +2381,7 @@
           <a:p>
             <a:fld id="{15D61805-E289-435F-9A60-4C8AC6F348D4}" type="datetimeFigureOut">
               <a:rPr lang="en-US" smtClean="0"/>
-              <a:t>5/9/2022</a:t>
+              <a:t>5/12/2022</a:t>
             </a:fld>
             <a:endParaRPr lang="en-US"/>
           </a:p>
@@ -2669,7 +2669,7 @@
           <a:p>
             <a:fld id="{15D61805-E289-435F-9A60-4C8AC6F348D4}" type="datetimeFigureOut">
               <a:rPr lang="en-US" smtClean="0"/>
-              <a:t>5/9/2022</a:t>
+              <a:t>5/12/2022</a:t>
             </a:fld>
             <a:endParaRPr lang="en-US"/>
           </a:p>
@@ -2910,7 +2910,7 @@
           <a:p>
             <a:fld id="{15D61805-E289-435F-9A60-4C8AC6F348D4}" type="datetimeFigureOut">
               <a:rPr lang="en-US" smtClean="0"/>
-              <a:t>5/9/2022</a:t>
+              <a:t>5/12/2022</a:t>
             </a:fld>
             <a:endParaRPr lang="en-US"/>
           </a:p>
@@ -3332,7 +3332,7 @@
           <p:cNvPr id="2" name="Title 1">
             <a:extLst>
               <a:ext uri="{FF2B5EF4-FFF2-40B4-BE49-F238E27FC236}">
-                <a16:creationId xmlns:a16="http://schemas.microsoft.com/office/drawing/2014/main" id="{3C5226CE-41C4-58FF-6D64-79F2E8E58D93}"/>
+                <a16:creationId xmlns:a16="http://schemas.microsoft.com/office/drawing/2014/main" id="{0FCDE5F0-B46A-7F18-6066-461FAC337044}"/>
               </a:ext>
             </a:extLst>
           </p:cNvPr>
@@ -3340,31 +3340,34 @@
             <a:spLocks noGrp="1"/>
           </p:cNvSpPr>
           <p:nvPr>
-            <p:ph type="ctrTitle"/>
+            <p:ph type="title"/>
           </p:nvPr>
         </p:nvSpPr>
         <p:spPr>
           <a:xfrm>
-            <a:off x="1524000" y="295565"/>
-            <a:ext cx="9144000" cy="3629890"/>
+            <a:off x="838200" y="497205"/>
+            <a:ext cx="10515600" cy="76095"/>
           </a:xfrm>
         </p:spPr>
         <p:txBody>
           <a:bodyPr>
-            <a:normAutofit/>
+            <a:normAutofit fontScale="90000"/>
           </a:bodyPr>
           <a:lstStyle/>
           <a:p>
+            <a:br>
+              <a:rPr lang="en-US" dirty="0"/>
+            </a:br>
             <a:endParaRPr lang="en-US" dirty="0"/>
           </a:p>
         </p:txBody>
       </p:sp>
       <p:sp>
         <p:nvSpPr>
-          <p:cNvPr id="3" name="Subtitle 2">
-            <a:extLst>
-              <a:ext uri="{FF2B5EF4-FFF2-40B4-BE49-F238E27FC236}">
-                <a16:creationId xmlns:a16="http://schemas.microsoft.com/office/drawing/2014/main" id="{25790ABC-CA99-A026-F19D-8906EA8DD22C}"/>
+          <p:cNvPr id="3" name="Content Placeholder 2">
+            <a:extLst>
+              <a:ext uri="{FF2B5EF4-FFF2-40B4-BE49-F238E27FC236}">
+                <a16:creationId xmlns:a16="http://schemas.microsoft.com/office/drawing/2014/main" id="{C66A27C2-DE94-AA11-0337-CF81B1C7396F}"/>
               </a:ext>
             </a:extLst>
           </p:cNvPr>
@@ -3372,29 +3375,1451 @@
             <a:spLocks noGrp="1"/>
           </p:cNvSpPr>
           <p:nvPr>
-            <p:ph type="subTitle" idx="1"/>
+            <p:ph idx="1"/>
           </p:nvPr>
         </p:nvSpPr>
         <p:spPr>
           <a:xfrm>
-            <a:off x="1524000" y="4248727"/>
-            <a:ext cx="9144000" cy="1009073"/>
-          </a:xfrm>
-        </p:spPr>
+            <a:off x="151002" y="83891"/>
+            <a:ext cx="11903977" cy="6694414"/>
+          </a:xfrm>
+          <a:noFill/>
+        </p:spPr>
+        <p:style>
+          <a:lnRef idx="2">
+            <a:schemeClr val="dk1"/>
+          </a:lnRef>
+          <a:fillRef idx="1">
+            <a:schemeClr val="lt1"/>
+          </a:fillRef>
+          <a:effectRef idx="0">
+            <a:schemeClr val="dk1"/>
+          </a:effectRef>
+          <a:fontRef idx="minor">
+            <a:schemeClr val="dk1"/>
+          </a:fontRef>
+        </p:style>
         <p:txBody>
           <a:bodyPr>
             <a:normAutofit/>
           </a:bodyPr>
           <a:lstStyle/>
           <a:p>
-            <a:endParaRPr lang="en-US" dirty="0"/>
+            <a:pPr marL="0" indent="0">
+              <a:buNone/>
+            </a:pPr>
+            <a:r>
+              <a:rPr lang="en-US" dirty="0"/>
+              <a:t>Live Data Providing Model</a:t>
+            </a:r>
+          </a:p>
+        </p:txBody>
+      </p:sp>
+      <p:sp>
+        <p:nvSpPr>
+          <p:cNvPr id="6" name="Rectangle 5">
+            <a:extLst>
+              <a:ext uri="{FF2B5EF4-FFF2-40B4-BE49-F238E27FC236}">
+                <a16:creationId xmlns:a16="http://schemas.microsoft.com/office/drawing/2014/main" id="{26EB8145-A39C-35C5-BF5C-C6E05740A9D0}"/>
+              </a:ext>
+            </a:extLst>
+          </p:cNvPr>
+          <p:cNvSpPr/>
+          <p:nvPr/>
+        </p:nvSpPr>
+        <p:spPr>
+          <a:xfrm>
+            <a:off x="9692039" y="4060272"/>
+            <a:ext cx="805345" cy="2418695"/>
+          </a:xfrm>
+          <a:prstGeom prst="rect">
+            <a:avLst/>
+          </a:prstGeom>
+        </p:spPr>
+        <p:style>
+          <a:lnRef idx="2">
+            <a:schemeClr val="dk1"/>
+          </a:lnRef>
+          <a:fillRef idx="1">
+            <a:schemeClr val="lt1"/>
+          </a:fillRef>
+          <a:effectRef idx="0">
+            <a:schemeClr val="dk1"/>
+          </a:effectRef>
+          <a:fontRef idx="minor">
+            <a:schemeClr val="dk1"/>
+          </a:fontRef>
+        </p:style>
+        <p:txBody>
+          <a:bodyPr rtlCol="0" anchor="ctr"/>
+          <a:lstStyle/>
+          <a:p>
+            <a:pPr algn="ctr"/>
+            <a:r>
+              <a:rPr lang="en-US" dirty="0"/>
+              <a:t>APC 1</a:t>
+            </a:r>
+          </a:p>
+        </p:txBody>
+      </p:sp>
+      <p:sp>
+        <p:nvSpPr>
+          <p:cNvPr id="7" name="Rectangle 6">
+            <a:extLst>
+              <a:ext uri="{FF2B5EF4-FFF2-40B4-BE49-F238E27FC236}">
+                <a16:creationId xmlns:a16="http://schemas.microsoft.com/office/drawing/2014/main" id="{A4480275-9CF1-FCD4-2E51-90E842F691C2}"/>
+              </a:ext>
+            </a:extLst>
+          </p:cNvPr>
+          <p:cNvSpPr/>
+          <p:nvPr/>
+        </p:nvSpPr>
+        <p:spPr>
+          <a:xfrm>
+            <a:off x="10924906" y="4060272"/>
+            <a:ext cx="805344" cy="2418695"/>
+          </a:xfrm>
+          <a:prstGeom prst="rect">
+            <a:avLst/>
+          </a:prstGeom>
+        </p:spPr>
+        <p:style>
+          <a:lnRef idx="2">
+            <a:schemeClr val="dk1"/>
+          </a:lnRef>
+          <a:fillRef idx="1">
+            <a:schemeClr val="lt1"/>
+          </a:fillRef>
+          <a:effectRef idx="0">
+            <a:schemeClr val="dk1"/>
+          </a:effectRef>
+          <a:fontRef idx="minor">
+            <a:schemeClr val="dk1"/>
+          </a:fontRef>
+        </p:style>
+        <p:txBody>
+          <a:bodyPr rtlCol="0" anchor="ctr"/>
+          <a:lstStyle/>
+          <a:p>
+            <a:pPr algn="ctr"/>
+            <a:r>
+              <a:rPr lang="en-US" dirty="0"/>
+              <a:t>APC n</a:t>
+            </a:r>
+          </a:p>
+        </p:txBody>
+      </p:sp>
+      <p:sp>
+        <p:nvSpPr>
+          <p:cNvPr id="10" name="Rectangle 9">
+            <a:extLst>
+              <a:ext uri="{FF2B5EF4-FFF2-40B4-BE49-F238E27FC236}">
+                <a16:creationId xmlns:a16="http://schemas.microsoft.com/office/drawing/2014/main" id="{78C0785B-E8A5-7D47-F6D0-CAF709F941F6}"/>
+              </a:ext>
+            </a:extLst>
+          </p:cNvPr>
+          <p:cNvSpPr/>
+          <p:nvPr/>
+        </p:nvSpPr>
+        <p:spPr>
+          <a:xfrm>
+            <a:off x="9692039" y="4060272"/>
+            <a:ext cx="805345" cy="939567"/>
+          </a:xfrm>
+          <a:prstGeom prst="rect">
+            <a:avLst/>
+          </a:prstGeom>
+        </p:spPr>
+        <p:style>
+          <a:lnRef idx="2">
+            <a:schemeClr val="accent1">
+              <a:shade val="50000"/>
+            </a:schemeClr>
+          </a:lnRef>
+          <a:fillRef idx="1">
+            <a:schemeClr val="accent1"/>
+          </a:fillRef>
+          <a:effectRef idx="0">
+            <a:schemeClr val="accent1"/>
+          </a:effectRef>
+          <a:fontRef idx="minor">
+            <a:schemeClr val="lt1"/>
+          </a:fontRef>
+        </p:style>
+        <p:txBody>
+          <a:bodyPr rtlCol="0" anchor="ctr"/>
+          <a:lstStyle/>
+          <a:p>
+            <a:pPr algn="ctr"/>
+            <a:r>
+              <a:rPr lang="en-US" dirty="0"/>
+              <a:t>Live Data</a:t>
+            </a:r>
+          </a:p>
+        </p:txBody>
+      </p:sp>
+      <p:sp>
+        <p:nvSpPr>
+          <p:cNvPr id="11" name="Rectangle 10">
+            <a:extLst>
+              <a:ext uri="{FF2B5EF4-FFF2-40B4-BE49-F238E27FC236}">
+                <a16:creationId xmlns:a16="http://schemas.microsoft.com/office/drawing/2014/main" id="{365DF609-FDCA-1958-E81F-85F8867E8566}"/>
+              </a:ext>
+            </a:extLst>
+          </p:cNvPr>
+          <p:cNvSpPr/>
+          <p:nvPr/>
+        </p:nvSpPr>
+        <p:spPr>
+          <a:xfrm>
+            <a:off x="10924906" y="4060272"/>
+            <a:ext cx="805344" cy="939567"/>
+          </a:xfrm>
+          <a:prstGeom prst="rect">
+            <a:avLst/>
+          </a:prstGeom>
+        </p:spPr>
+        <p:style>
+          <a:lnRef idx="2">
+            <a:schemeClr val="accent1">
+              <a:shade val="50000"/>
+            </a:schemeClr>
+          </a:lnRef>
+          <a:fillRef idx="1">
+            <a:schemeClr val="accent1"/>
+          </a:fillRef>
+          <a:effectRef idx="0">
+            <a:schemeClr val="accent1"/>
+          </a:effectRef>
+          <a:fontRef idx="minor">
+            <a:schemeClr val="lt1"/>
+          </a:fontRef>
+        </p:style>
+        <p:txBody>
+          <a:bodyPr rtlCol="0" anchor="ctr"/>
+          <a:lstStyle/>
+          <a:p>
+            <a:pPr algn="ctr"/>
+            <a:r>
+              <a:rPr lang="en-US" dirty="0"/>
+              <a:t>Live Data</a:t>
+            </a:r>
+          </a:p>
+        </p:txBody>
+      </p:sp>
+      <p:sp>
+        <p:nvSpPr>
+          <p:cNvPr id="12" name="Rectangle 11">
+            <a:extLst>
+              <a:ext uri="{FF2B5EF4-FFF2-40B4-BE49-F238E27FC236}">
+                <a16:creationId xmlns:a16="http://schemas.microsoft.com/office/drawing/2014/main" id="{154A11CC-9798-24C3-2464-614BEFA6C303}"/>
+              </a:ext>
+            </a:extLst>
+          </p:cNvPr>
+          <p:cNvSpPr/>
+          <p:nvPr/>
+        </p:nvSpPr>
+        <p:spPr>
+          <a:xfrm>
+            <a:off x="3934612" y="4321878"/>
+            <a:ext cx="3973584" cy="1560353"/>
+          </a:xfrm>
+          <a:prstGeom prst="rect">
+            <a:avLst/>
+          </a:prstGeom>
+        </p:spPr>
+        <p:style>
+          <a:lnRef idx="2">
+            <a:schemeClr val="dk1"/>
+          </a:lnRef>
+          <a:fillRef idx="1">
+            <a:schemeClr val="lt1"/>
+          </a:fillRef>
+          <a:effectRef idx="0">
+            <a:schemeClr val="dk1"/>
+          </a:effectRef>
+          <a:fontRef idx="minor">
+            <a:schemeClr val="dk1"/>
+          </a:fontRef>
+        </p:style>
+        <p:txBody>
+          <a:bodyPr rtlCol="0" anchor="ctr"/>
+          <a:lstStyle/>
+          <a:p>
+            <a:pPr algn="ctr"/>
+            <a:r>
+              <a:rPr lang="en-US" dirty="0"/>
+              <a:t>Worker Service</a:t>
+            </a:r>
+          </a:p>
+        </p:txBody>
+      </p:sp>
+      <p:sp>
+        <p:nvSpPr>
+          <p:cNvPr id="14" name="Arrow: Left 13">
+            <a:extLst>
+              <a:ext uri="{FF2B5EF4-FFF2-40B4-BE49-F238E27FC236}">
+                <a16:creationId xmlns:a16="http://schemas.microsoft.com/office/drawing/2014/main" id="{00BE6485-E7B1-16E0-2D58-9B45BD5456A0}"/>
+              </a:ext>
+            </a:extLst>
+          </p:cNvPr>
+          <p:cNvSpPr/>
+          <p:nvPr/>
+        </p:nvSpPr>
+        <p:spPr>
+          <a:xfrm flipV="1">
+            <a:off x="7955270" y="5391471"/>
+            <a:ext cx="1504925" cy="114965"/>
+          </a:xfrm>
+          <a:prstGeom prst="leftArrow">
+            <a:avLst/>
+          </a:prstGeom>
+        </p:spPr>
+        <p:style>
+          <a:lnRef idx="2">
+            <a:schemeClr val="dk1"/>
+          </a:lnRef>
+          <a:fillRef idx="1">
+            <a:schemeClr val="lt1"/>
+          </a:fillRef>
+          <a:effectRef idx="0">
+            <a:schemeClr val="dk1"/>
+          </a:effectRef>
+          <a:fontRef idx="minor">
+            <a:schemeClr val="dk1"/>
+          </a:fontRef>
+        </p:style>
+        <p:txBody>
+          <a:bodyPr rtlCol="0" anchor="ctr"/>
+          <a:lstStyle/>
+          <a:p>
+            <a:pPr algn="ctr"/>
+            <a:endParaRPr lang="en-US"/>
+          </a:p>
+        </p:txBody>
+      </p:sp>
+      <p:sp>
+        <p:nvSpPr>
+          <p:cNvPr id="15" name="TextBox 14">
+            <a:extLst>
+              <a:ext uri="{FF2B5EF4-FFF2-40B4-BE49-F238E27FC236}">
+                <a16:creationId xmlns:a16="http://schemas.microsoft.com/office/drawing/2014/main" id="{B255AB5D-8EC1-B09D-11C6-2E8E565979ED}"/>
+              </a:ext>
+            </a:extLst>
+          </p:cNvPr>
+          <p:cNvSpPr txBox="1"/>
+          <p:nvPr/>
+        </p:nvSpPr>
+        <p:spPr>
+          <a:xfrm>
+            <a:off x="8242720" y="4452140"/>
+            <a:ext cx="1031846" cy="369332"/>
+          </a:xfrm>
+          <a:prstGeom prst="rect">
+            <a:avLst/>
+          </a:prstGeom>
+          <a:noFill/>
+        </p:spPr>
+        <p:txBody>
+          <a:bodyPr wrap="square" rtlCol="0">
+            <a:spAutoFit/>
+          </a:bodyPr>
+          <a:lstStyle/>
+          <a:p>
+            <a:r>
+              <a:rPr lang="en-US" dirty="0"/>
+              <a:t>Request</a:t>
+            </a:r>
+          </a:p>
+        </p:txBody>
+      </p:sp>
+      <p:sp>
+        <p:nvSpPr>
+          <p:cNvPr id="20" name="Flowchart: Process 19">
+            <a:extLst>
+              <a:ext uri="{FF2B5EF4-FFF2-40B4-BE49-F238E27FC236}">
+                <a16:creationId xmlns:a16="http://schemas.microsoft.com/office/drawing/2014/main" id="{B17489CD-4A7B-6D63-DBDF-FE258BC8609D}"/>
+              </a:ext>
+            </a:extLst>
+          </p:cNvPr>
+          <p:cNvSpPr/>
+          <p:nvPr/>
+        </p:nvSpPr>
+        <p:spPr>
+          <a:xfrm>
+            <a:off x="9550520" y="3731004"/>
+            <a:ext cx="2313965" cy="2904688"/>
+          </a:xfrm>
+          <a:prstGeom prst="flowChartProcess">
+            <a:avLst/>
+          </a:prstGeom>
+          <a:noFill/>
+        </p:spPr>
+        <p:style>
+          <a:lnRef idx="2">
+            <a:schemeClr val="accent1">
+              <a:shade val="50000"/>
+            </a:schemeClr>
+          </a:lnRef>
+          <a:fillRef idx="1">
+            <a:schemeClr val="accent1"/>
+          </a:fillRef>
+          <a:effectRef idx="0">
+            <a:schemeClr val="accent1"/>
+          </a:effectRef>
+          <a:fontRef idx="minor">
+            <a:schemeClr val="lt1"/>
+          </a:fontRef>
+        </p:style>
+        <p:txBody>
+          <a:bodyPr rtlCol="0" anchor="ctr"/>
+          <a:lstStyle/>
+          <a:p>
+            <a:pPr algn="ctr"/>
+            <a:endParaRPr lang="en-US"/>
+          </a:p>
+        </p:txBody>
+      </p:sp>
+      <p:sp>
+        <p:nvSpPr>
+          <p:cNvPr id="21" name="TextBox 20">
+            <a:extLst>
+              <a:ext uri="{FF2B5EF4-FFF2-40B4-BE49-F238E27FC236}">
+                <a16:creationId xmlns:a16="http://schemas.microsoft.com/office/drawing/2014/main" id="{89B277DA-1B03-6579-061B-1D2A330125F9}"/>
+              </a:ext>
+            </a:extLst>
+          </p:cNvPr>
+          <p:cNvSpPr txBox="1"/>
+          <p:nvPr/>
+        </p:nvSpPr>
+        <p:spPr>
+          <a:xfrm>
+            <a:off x="8240034" y="4677720"/>
+            <a:ext cx="1295049" cy="369332"/>
+          </a:xfrm>
+          <a:prstGeom prst="rect">
+            <a:avLst/>
+          </a:prstGeom>
+          <a:noFill/>
+        </p:spPr>
+        <p:txBody>
+          <a:bodyPr wrap="square" rtlCol="0">
+            <a:spAutoFit/>
+          </a:bodyPr>
+          <a:lstStyle/>
+          <a:p>
+            <a:r>
+              <a:rPr lang="en-US" dirty="0"/>
+              <a:t>1x200 msec</a:t>
+            </a:r>
+          </a:p>
+        </p:txBody>
+      </p:sp>
+      <p:sp>
+        <p:nvSpPr>
+          <p:cNvPr id="24" name="TextBox 23">
+            <a:extLst>
+              <a:ext uri="{FF2B5EF4-FFF2-40B4-BE49-F238E27FC236}">
+                <a16:creationId xmlns:a16="http://schemas.microsoft.com/office/drawing/2014/main" id="{C90D6EA0-8B76-D0F0-D554-89C4C7C5F7EE}"/>
+              </a:ext>
+            </a:extLst>
+          </p:cNvPr>
+          <p:cNvSpPr txBox="1"/>
+          <p:nvPr/>
+        </p:nvSpPr>
+        <p:spPr>
+          <a:xfrm>
+            <a:off x="8240034" y="5433040"/>
+            <a:ext cx="1140902" cy="369332"/>
+          </a:xfrm>
+          <a:prstGeom prst="rect">
+            <a:avLst/>
+          </a:prstGeom>
+          <a:noFill/>
+        </p:spPr>
+        <p:txBody>
+          <a:bodyPr wrap="square" rtlCol="0">
+            <a:spAutoFit/>
+          </a:bodyPr>
+          <a:lstStyle/>
+          <a:p>
+            <a:r>
+              <a:rPr lang="en-US" dirty="0"/>
+              <a:t>Response</a:t>
+            </a:r>
+          </a:p>
+        </p:txBody>
+      </p:sp>
+      <p:sp>
+        <p:nvSpPr>
+          <p:cNvPr id="26" name="Arrow: Right 25">
+            <a:extLst>
+              <a:ext uri="{FF2B5EF4-FFF2-40B4-BE49-F238E27FC236}">
+                <a16:creationId xmlns:a16="http://schemas.microsoft.com/office/drawing/2014/main" id="{81C2F11B-5B22-86BC-0CAF-60CD9389C849}"/>
+              </a:ext>
+            </a:extLst>
+          </p:cNvPr>
+          <p:cNvSpPr/>
+          <p:nvPr/>
+        </p:nvSpPr>
+        <p:spPr>
+          <a:xfrm>
+            <a:off x="2230694" y="3915097"/>
+            <a:ext cx="2239865" cy="88884"/>
+          </a:xfrm>
+          <a:prstGeom prst="rightArrow">
+            <a:avLst/>
+          </a:prstGeom>
+        </p:spPr>
+        <p:style>
+          <a:lnRef idx="2">
+            <a:schemeClr val="dk1"/>
+          </a:lnRef>
+          <a:fillRef idx="1">
+            <a:schemeClr val="lt1"/>
+          </a:fillRef>
+          <a:effectRef idx="0">
+            <a:schemeClr val="dk1"/>
+          </a:effectRef>
+          <a:fontRef idx="minor">
+            <a:schemeClr val="dk1"/>
+          </a:fontRef>
+        </p:style>
+        <p:txBody>
+          <a:bodyPr rtlCol="0" anchor="ctr"/>
+          <a:lstStyle/>
+          <a:p>
+            <a:pPr algn="ctr"/>
+            <a:endParaRPr lang="en-US"/>
+          </a:p>
+        </p:txBody>
+      </p:sp>
+      <p:sp>
+        <p:nvSpPr>
+          <p:cNvPr id="27" name="Rectangle 26">
+            <a:extLst>
+              <a:ext uri="{FF2B5EF4-FFF2-40B4-BE49-F238E27FC236}">
+                <a16:creationId xmlns:a16="http://schemas.microsoft.com/office/drawing/2014/main" id="{F5C39E6A-077F-D32D-5934-0ACC3059F540}"/>
+              </a:ext>
+            </a:extLst>
+          </p:cNvPr>
+          <p:cNvSpPr/>
+          <p:nvPr/>
+        </p:nvSpPr>
+        <p:spPr>
+          <a:xfrm>
+            <a:off x="752208" y="3731004"/>
+            <a:ext cx="1444303" cy="2747963"/>
+          </a:xfrm>
+          <a:prstGeom prst="rect">
+            <a:avLst/>
+          </a:prstGeom>
+        </p:spPr>
+        <p:style>
+          <a:lnRef idx="2">
+            <a:schemeClr val="dk1"/>
+          </a:lnRef>
+          <a:fillRef idx="1">
+            <a:schemeClr val="lt1"/>
+          </a:fillRef>
+          <a:effectRef idx="0">
+            <a:schemeClr val="dk1"/>
+          </a:effectRef>
+          <a:fontRef idx="minor">
+            <a:schemeClr val="dk1"/>
+          </a:fontRef>
+        </p:style>
+        <p:txBody>
+          <a:bodyPr rtlCol="0" anchor="ctr"/>
+          <a:lstStyle/>
+          <a:p>
+            <a:pPr algn="ctr"/>
+            <a:endParaRPr lang="en-US"/>
+          </a:p>
+        </p:txBody>
+      </p:sp>
+      <p:sp>
+        <p:nvSpPr>
+          <p:cNvPr id="28" name="Rectangle 27">
+            <a:extLst>
+              <a:ext uri="{FF2B5EF4-FFF2-40B4-BE49-F238E27FC236}">
+                <a16:creationId xmlns:a16="http://schemas.microsoft.com/office/drawing/2014/main" id="{D61AA68A-C3BE-6064-24FC-9A071A105F41}"/>
+              </a:ext>
+            </a:extLst>
+          </p:cNvPr>
+          <p:cNvSpPr/>
+          <p:nvPr/>
+        </p:nvSpPr>
+        <p:spPr>
+          <a:xfrm>
+            <a:off x="752207" y="3731004"/>
+            <a:ext cx="1444303" cy="924887"/>
+          </a:xfrm>
+          <a:prstGeom prst="rect">
+            <a:avLst/>
+          </a:prstGeom>
+        </p:spPr>
+        <p:style>
+          <a:lnRef idx="2">
+            <a:schemeClr val="accent1">
+              <a:shade val="50000"/>
+            </a:schemeClr>
+          </a:lnRef>
+          <a:fillRef idx="1">
+            <a:schemeClr val="accent1"/>
+          </a:fillRef>
+          <a:effectRef idx="0">
+            <a:schemeClr val="accent1"/>
+          </a:effectRef>
+          <a:fontRef idx="minor">
+            <a:schemeClr val="lt1"/>
+          </a:fontRef>
+        </p:style>
+        <p:txBody>
+          <a:bodyPr rtlCol="0" anchor="ctr"/>
+          <a:lstStyle/>
+          <a:p>
+            <a:pPr algn="ctr"/>
+            <a:r>
+              <a:rPr lang="en-US" dirty="0"/>
+              <a:t>Live Data</a:t>
+            </a:r>
+          </a:p>
+        </p:txBody>
+      </p:sp>
+      <p:sp>
+        <p:nvSpPr>
+          <p:cNvPr id="29" name="TextBox 28">
+            <a:extLst>
+              <a:ext uri="{FF2B5EF4-FFF2-40B4-BE49-F238E27FC236}">
+                <a16:creationId xmlns:a16="http://schemas.microsoft.com/office/drawing/2014/main" id="{23906D2E-057E-14B2-A230-EF3C447B634B}"/>
+              </a:ext>
+            </a:extLst>
+          </p:cNvPr>
+          <p:cNvSpPr txBox="1"/>
+          <p:nvPr/>
+        </p:nvSpPr>
+        <p:spPr>
+          <a:xfrm>
+            <a:off x="9771294" y="3429000"/>
+            <a:ext cx="1996580" cy="369332"/>
+          </a:xfrm>
+          <a:prstGeom prst="rect">
+            <a:avLst/>
+          </a:prstGeom>
+          <a:noFill/>
+        </p:spPr>
+        <p:txBody>
+          <a:bodyPr wrap="square" rtlCol="0">
+            <a:spAutoFit/>
+          </a:bodyPr>
+          <a:lstStyle/>
+          <a:p>
+            <a:r>
+              <a:rPr lang="en-US" dirty="0"/>
+              <a:t>Data Model Object</a:t>
+            </a:r>
+          </a:p>
+        </p:txBody>
+      </p:sp>
+      <p:sp>
+        <p:nvSpPr>
+          <p:cNvPr id="30" name="Flowchart: Process 29">
+            <a:extLst>
+              <a:ext uri="{FF2B5EF4-FFF2-40B4-BE49-F238E27FC236}">
+                <a16:creationId xmlns:a16="http://schemas.microsoft.com/office/drawing/2014/main" id="{4D39115E-949B-306D-B970-DA22DF5D9E8B}"/>
+              </a:ext>
+            </a:extLst>
+          </p:cNvPr>
+          <p:cNvSpPr/>
+          <p:nvPr/>
+        </p:nvSpPr>
+        <p:spPr>
+          <a:xfrm>
+            <a:off x="6396796" y="2785145"/>
+            <a:ext cx="2701254" cy="752912"/>
+          </a:xfrm>
+          <a:prstGeom prst="flowChartProcess">
+            <a:avLst/>
+          </a:prstGeom>
+        </p:spPr>
+        <p:style>
+          <a:lnRef idx="2">
+            <a:schemeClr val="dk1"/>
+          </a:lnRef>
+          <a:fillRef idx="1">
+            <a:schemeClr val="lt1"/>
+          </a:fillRef>
+          <a:effectRef idx="0">
+            <a:schemeClr val="dk1"/>
+          </a:effectRef>
+          <a:fontRef idx="minor">
+            <a:schemeClr val="dk1"/>
+          </a:fontRef>
+        </p:style>
+        <p:txBody>
+          <a:bodyPr rtlCol="0" anchor="ctr"/>
+          <a:lstStyle/>
+          <a:p>
+            <a:pPr algn="ctr"/>
+            <a:r>
+              <a:rPr lang="en-US" dirty="0"/>
+              <a:t>Component Data Provider</a:t>
+            </a:r>
+          </a:p>
+          <a:p>
+            <a:pPr algn="ctr"/>
+            <a:r>
+              <a:rPr lang="en-US" dirty="0"/>
+              <a:t>Service</a:t>
+            </a:r>
+          </a:p>
+        </p:txBody>
+      </p:sp>
+      <p:sp>
+        <p:nvSpPr>
+          <p:cNvPr id="31" name="Arrow: Up 30">
+            <a:extLst>
+              <a:ext uri="{FF2B5EF4-FFF2-40B4-BE49-F238E27FC236}">
+                <a16:creationId xmlns:a16="http://schemas.microsoft.com/office/drawing/2014/main" id="{4FD48C93-42C4-77C1-7A77-88E2A9719EBD}"/>
+              </a:ext>
+            </a:extLst>
+          </p:cNvPr>
+          <p:cNvSpPr/>
+          <p:nvPr/>
+        </p:nvSpPr>
+        <p:spPr>
+          <a:xfrm>
+            <a:off x="7218376" y="3624044"/>
+            <a:ext cx="92279" cy="612396"/>
+          </a:xfrm>
+          <a:prstGeom prst="upArrow">
+            <a:avLst/>
+          </a:prstGeom>
+        </p:spPr>
+        <p:style>
+          <a:lnRef idx="2">
+            <a:schemeClr val="dk1"/>
+          </a:lnRef>
+          <a:fillRef idx="1">
+            <a:schemeClr val="lt1"/>
+          </a:fillRef>
+          <a:effectRef idx="0">
+            <a:schemeClr val="dk1"/>
+          </a:effectRef>
+          <a:fontRef idx="minor">
+            <a:schemeClr val="dk1"/>
+          </a:fontRef>
+        </p:style>
+        <p:txBody>
+          <a:bodyPr rtlCol="0" anchor="ctr"/>
+          <a:lstStyle/>
+          <a:p>
+            <a:pPr algn="ctr"/>
+            <a:endParaRPr lang="en-US"/>
+          </a:p>
+        </p:txBody>
+      </p:sp>
+      <p:sp>
+        <p:nvSpPr>
+          <p:cNvPr id="32" name="Flowchart: Process 31">
+            <a:extLst>
+              <a:ext uri="{FF2B5EF4-FFF2-40B4-BE49-F238E27FC236}">
+                <a16:creationId xmlns:a16="http://schemas.microsoft.com/office/drawing/2014/main" id="{1264513D-BD2F-2ECB-0359-9E54A78B1A84}"/>
+              </a:ext>
+            </a:extLst>
+          </p:cNvPr>
+          <p:cNvSpPr/>
+          <p:nvPr/>
+        </p:nvSpPr>
+        <p:spPr>
+          <a:xfrm>
+            <a:off x="7696203" y="1466526"/>
+            <a:ext cx="1368804" cy="698383"/>
+          </a:xfrm>
+          <a:prstGeom prst="flowChartProcess">
+            <a:avLst/>
+          </a:prstGeom>
+        </p:spPr>
+        <p:style>
+          <a:lnRef idx="2">
+            <a:schemeClr val="dk1"/>
+          </a:lnRef>
+          <a:fillRef idx="1">
+            <a:schemeClr val="lt1"/>
+          </a:fillRef>
+          <a:effectRef idx="0">
+            <a:schemeClr val="dk1"/>
+          </a:effectRef>
+          <a:fontRef idx="minor">
+            <a:schemeClr val="dk1"/>
+          </a:fontRef>
+        </p:style>
+        <p:txBody>
+          <a:bodyPr rtlCol="0" anchor="ctr"/>
+          <a:lstStyle/>
+          <a:p>
+            <a:pPr algn="ctr"/>
+            <a:r>
+              <a:rPr lang="en-US" dirty="0" err="1"/>
+              <a:t>Blazor</a:t>
+            </a:r>
+            <a:r>
+              <a:rPr lang="en-US" dirty="0"/>
+              <a:t> Component</a:t>
+            </a:r>
+          </a:p>
+        </p:txBody>
+      </p:sp>
+      <p:sp>
+        <p:nvSpPr>
+          <p:cNvPr id="34" name="Arrow: Up 33">
+            <a:extLst>
+              <a:ext uri="{FF2B5EF4-FFF2-40B4-BE49-F238E27FC236}">
+                <a16:creationId xmlns:a16="http://schemas.microsoft.com/office/drawing/2014/main" id="{48C8015F-6DB7-526C-8025-BBA19A2D7D50}"/>
+              </a:ext>
+            </a:extLst>
+          </p:cNvPr>
+          <p:cNvSpPr/>
+          <p:nvPr/>
+        </p:nvSpPr>
+        <p:spPr>
+          <a:xfrm>
+            <a:off x="8350103" y="2215964"/>
+            <a:ext cx="92278" cy="518944"/>
+          </a:xfrm>
+          <a:prstGeom prst="upArrow">
+            <a:avLst/>
+          </a:prstGeom>
+        </p:spPr>
+        <p:style>
+          <a:lnRef idx="2">
+            <a:schemeClr val="dk1"/>
+          </a:lnRef>
+          <a:fillRef idx="1">
+            <a:schemeClr val="lt1"/>
+          </a:fillRef>
+          <a:effectRef idx="0">
+            <a:schemeClr val="dk1"/>
+          </a:effectRef>
+          <a:fontRef idx="minor">
+            <a:schemeClr val="dk1"/>
+          </a:fontRef>
+        </p:style>
+        <p:txBody>
+          <a:bodyPr rtlCol="0" anchor="ctr"/>
+          <a:lstStyle/>
+          <a:p>
+            <a:pPr algn="ctr"/>
+            <a:endParaRPr lang="en-US"/>
+          </a:p>
+        </p:txBody>
+      </p:sp>
+      <p:sp>
+        <p:nvSpPr>
+          <p:cNvPr id="35" name="Flowchart: Process 34">
+            <a:extLst>
+              <a:ext uri="{FF2B5EF4-FFF2-40B4-BE49-F238E27FC236}">
+                <a16:creationId xmlns:a16="http://schemas.microsoft.com/office/drawing/2014/main" id="{4D5EB697-3A87-9537-6BCF-38F9A3B79AEB}"/>
+              </a:ext>
+            </a:extLst>
+          </p:cNvPr>
+          <p:cNvSpPr/>
+          <p:nvPr/>
+        </p:nvSpPr>
+        <p:spPr>
+          <a:xfrm>
+            <a:off x="5603845" y="1506027"/>
+            <a:ext cx="1275131" cy="268449"/>
+          </a:xfrm>
+          <a:prstGeom prst="flowChartProcess">
+            <a:avLst/>
+          </a:prstGeom>
+        </p:spPr>
+        <p:style>
+          <a:lnRef idx="2">
+            <a:schemeClr val="dk1"/>
+          </a:lnRef>
+          <a:fillRef idx="1">
+            <a:schemeClr val="lt1"/>
+          </a:fillRef>
+          <a:effectRef idx="0">
+            <a:schemeClr val="dk1"/>
+          </a:effectRef>
+          <a:fontRef idx="minor">
+            <a:schemeClr val="dk1"/>
+          </a:fontRef>
+        </p:style>
+        <p:txBody>
+          <a:bodyPr rtlCol="0" anchor="ctr"/>
+          <a:lstStyle/>
+          <a:p>
+            <a:pPr algn="ctr"/>
+            <a:r>
+              <a:rPr lang="en-US" dirty="0"/>
+              <a:t>Client WB 1</a:t>
+            </a:r>
+          </a:p>
+        </p:txBody>
+      </p:sp>
+      <p:sp>
+        <p:nvSpPr>
+          <p:cNvPr id="38" name="Flowchart: Process 37">
+            <a:extLst>
+              <a:ext uri="{FF2B5EF4-FFF2-40B4-BE49-F238E27FC236}">
+                <a16:creationId xmlns:a16="http://schemas.microsoft.com/office/drawing/2014/main" id="{0893C6B9-EDFF-36BC-3E31-CE18FC8EA1F9}"/>
+              </a:ext>
+            </a:extLst>
+          </p:cNvPr>
+          <p:cNvSpPr/>
+          <p:nvPr/>
+        </p:nvSpPr>
+        <p:spPr>
+          <a:xfrm>
+            <a:off x="5603845" y="1903251"/>
+            <a:ext cx="1275132" cy="268449"/>
+          </a:xfrm>
+          <a:prstGeom prst="flowChartProcess">
+            <a:avLst/>
+          </a:prstGeom>
+        </p:spPr>
+        <p:style>
+          <a:lnRef idx="2">
+            <a:schemeClr val="dk1"/>
+          </a:lnRef>
+          <a:fillRef idx="1">
+            <a:schemeClr val="lt1"/>
+          </a:fillRef>
+          <a:effectRef idx="0">
+            <a:schemeClr val="dk1"/>
+          </a:effectRef>
+          <a:fontRef idx="minor">
+            <a:schemeClr val="dk1"/>
+          </a:fontRef>
+        </p:style>
+        <p:txBody>
+          <a:bodyPr rtlCol="0" anchor="ctr"/>
+          <a:lstStyle/>
+          <a:p>
+            <a:pPr algn="ctr"/>
+            <a:r>
+              <a:rPr lang="en-US" dirty="0"/>
+              <a:t>Client WB n</a:t>
+            </a:r>
+          </a:p>
+        </p:txBody>
+      </p:sp>
+      <p:sp>
+        <p:nvSpPr>
+          <p:cNvPr id="41" name="Arrow: Left 40">
+            <a:extLst>
+              <a:ext uri="{FF2B5EF4-FFF2-40B4-BE49-F238E27FC236}">
+                <a16:creationId xmlns:a16="http://schemas.microsoft.com/office/drawing/2014/main" id="{1B2FE5F2-3305-8FA2-3C49-6467C868D806}"/>
+              </a:ext>
+            </a:extLst>
+          </p:cNvPr>
+          <p:cNvSpPr/>
+          <p:nvPr/>
+        </p:nvSpPr>
+        <p:spPr>
+          <a:xfrm>
+            <a:off x="6920919" y="1613954"/>
+            <a:ext cx="713061" cy="81030"/>
+          </a:xfrm>
+          <a:prstGeom prst="leftArrow">
+            <a:avLst/>
+          </a:prstGeom>
+        </p:spPr>
+        <p:style>
+          <a:lnRef idx="2">
+            <a:schemeClr val="dk1"/>
+          </a:lnRef>
+          <a:fillRef idx="1">
+            <a:schemeClr val="lt1"/>
+          </a:fillRef>
+          <a:effectRef idx="0">
+            <a:schemeClr val="dk1"/>
+          </a:effectRef>
+          <a:fontRef idx="minor">
+            <a:schemeClr val="dk1"/>
+          </a:fontRef>
+        </p:style>
+        <p:txBody>
+          <a:bodyPr rtlCol="0" anchor="ctr"/>
+          <a:lstStyle/>
+          <a:p>
+            <a:pPr algn="ctr"/>
+            <a:endParaRPr lang="en-US"/>
+          </a:p>
+        </p:txBody>
+      </p:sp>
+      <p:sp>
+        <p:nvSpPr>
+          <p:cNvPr id="42" name="Arrow: Left 41">
+            <a:extLst>
+              <a:ext uri="{FF2B5EF4-FFF2-40B4-BE49-F238E27FC236}">
+                <a16:creationId xmlns:a16="http://schemas.microsoft.com/office/drawing/2014/main" id="{FA8FB0AD-1479-1039-F309-EDE0CBAAED5A}"/>
+              </a:ext>
+            </a:extLst>
+          </p:cNvPr>
+          <p:cNvSpPr/>
+          <p:nvPr/>
+        </p:nvSpPr>
+        <p:spPr>
+          <a:xfrm>
+            <a:off x="6920919" y="1999847"/>
+            <a:ext cx="713062" cy="81030"/>
+          </a:xfrm>
+          <a:prstGeom prst="leftArrow">
+            <a:avLst/>
+          </a:prstGeom>
+        </p:spPr>
+        <p:style>
+          <a:lnRef idx="2">
+            <a:schemeClr val="dk1"/>
+          </a:lnRef>
+          <a:fillRef idx="1">
+            <a:schemeClr val="lt1"/>
+          </a:fillRef>
+          <a:effectRef idx="0">
+            <a:schemeClr val="dk1"/>
+          </a:effectRef>
+          <a:fontRef idx="minor">
+            <a:schemeClr val="dk1"/>
+          </a:fontRef>
+        </p:style>
+        <p:txBody>
+          <a:bodyPr rtlCol="0" anchor="ctr"/>
+          <a:lstStyle/>
+          <a:p>
+            <a:pPr algn="ctr"/>
+            <a:endParaRPr lang="en-US"/>
+          </a:p>
+        </p:txBody>
+      </p:sp>
+      <p:sp>
+        <p:nvSpPr>
+          <p:cNvPr id="4" name="Flowchart: Process 3">
+            <a:extLst>
+              <a:ext uri="{FF2B5EF4-FFF2-40B4-BE49-F238E27FC236}">
+                <a16:creationId xmlns:a16="http://schemas.microsoft.com/office/drawing/2014/main" id="{F734A7B7-F0CE-7A49-EDA8-50AC59B6FAD2}"/>
+              </a:ext>
+            </a:extLst>
+          </p:cNvPr>
+          <p:cNvSpPr/>
+          <p:nvPr/>
+        </p:nvSpPr>
+        <p:spPr>
+          <a:xfrm>
+            <a:off x="2814692" y="2785144"/>
+            <a:ext cx="2877423" cy="745277"/>
+          </a:xfrm>
+          <a:prstGeom prst="flowChartProcess">
+            <a:avLst/>
+          </a:prstGeom>
+        </p:spPr>
+        <p:style>
+          <a:lnRef idx="2">
+            <a:schemeClr val="dk1"/>
+          </a:lnRef>
+          <a:fillRef idx="1">
+            <a:schemeClr val="lt1"/>
+          </a:fillRef>
+          <a:effectRef idx="0">
+            <a:schemeClr val="dk1"/>
+          </a:effectRef>
+          <a:fontRef idx="minor">
+            <a:schemeClr val="dk1"/>
+          </a:fontRef>
+        </p:style>
+        <p:txBody>
+          <a:bodyPr rtlCol="0" anchor="ctr"/>
+          <a:lstStyle/>
+          <a:p>
+            <a:pPr algn="ctr"/>
+            <a:r>
+              <a:rPr lang="en-US" dirty="0"/>
+              <a:t>MQTT Data Provider </a:t>
+            </a:r>
+          </a:p>
+          <a:p>
+            <a:pPr algn="ctr"/>
+            <a:r>
+              <a:rPr lang="en-US" dirty="0"/>
+              <a:t>Service</a:t>
+            </a:r>
+          </a:p>
+        </p:txBody>
+      </p:sp>
+      <p:sp>
+        <p:nvSpPr>
+          <p:cNvPr id="5" name="Arrow: Up 4">
+            <a:extLst>
+              <a:ext uri="{FF2B5EF4-FFF2-40B4-BE49-F238E27FC236}">
+                <a16:creationId xmlns:a16="http://schemas.microsoft.com/office/drawing/2014/main" id="{61D93491-D42C-B2B0-FAB7-E921FC168010}"/>
+              </a:ext>
+            </a:extLst>
+          </p:cNvPr>
+          <p:cNvSpPr/>
+          <p:nvPr/>
+        </p:nvSpPr>
+        <p:spPr>
+          <a:xfrm>
+            <a:off x="4481362" y="3624044"/>
+            <a:ext cx="92279" cy="612396"/>
+          </a:xfrm>
+          <a:prstGeom prst="upArrow">
+            <a:avLst/>
+          </a:prstGeom>
+        </p:spPr>
+        <p:style>
+          <a:lnRef idx="2">
+            <a:schemeClr val="dk1"/>
+          </a:lnRef>
+          <a:fillRef idx="1">
+            <a:schemeClr val="lt1"/>
+          </a:fillRef>
+          <a:effectRef idx="0">
+            <a:schemeClr val="dk1"/>
+          </a:effectRef>
+          <a:fontRef idx="minor">
+            <a:schemeClr val="dk1"/>
+          </a:fontRef>
+        </p:style>
+        <p:txBody>
+          <a:bodyPr rtlCol="0" anchor="ctr"/>
+          <a:lstStyle/>
+          <a:p>
+            <a:pPr algn="ctr"/>
+            <a:endParaRPr lang="en-US"/>
+          </a:p>
+        </p:txBody>
+      </p:sp>
+      <p:sp>
+        <p:nvSpPr>
+          <p:cNvPr id="8" name="Arrow: Up 7">
+            <a:extLst>
+              <a:ext uri="{FF2B5EF4-FFF2-40B4-BE49-F238E27FC236}">
+                <a16:creationId xmlns:a16="http://schemas.microsoft.com/office/drawing/2014/main" id="{AAF1CF5F-0785-698C-A334-3BF2EB621CC5}"/>
+              </a:ext>
+            </a:extLst>
+          </p:cNvPr>
+          <p:cNvSpPr/>
+          <p:nvPr/>
+        </p:nvSpPr>
+        <p:spPr>
+          <a:xfrm flipH="1">
+            <a:off x="4001548" y="2217026"/>
+            <a:ext cx="92278" cy="519821"/>
+          </a:xfrm>
+          <a:prstGeom prst="upArrow">
+            <a:avLst/>
+          </a:prstGeom>
+        </p:spPr>
+        <p:style>
+          <a:lnRef idx="2">
+            <a:schemeClr val="dk1"/>
+          </a:lnRef>
+          <a:fillRef idx="1">
+            <a:schemeClr val="lt1"/>
+          </a:fillRef>
+          <a:effectRef idx="0">
+            <a:schemeClr val="dk1"/>
+          </a:effectRef>
+          <a:fontRef idx="minor">
+            <a:schemeClr val="dk1"/>
+          </a:fontRef>
+        </p:style>
+        <p:txBody>
+          <a:bodyPr rtlCol="0" anchor="ctr"/>
+          <a:lstStyle/>
+          <a:p>
+            <a:pPr algn="ctr"/>
+            <a:endParaRPr lang="en-US"/>
+          </a:p>
+        </p:txBody>
+      </p:sp>
+      <p:sp>
+        <p:nvSpPr>
+          <p:cNvPr id="9" name="Flowchart: Process 8">
+            <a:extLst>
+              <a:ext uri="{FF2B5EF4-FFF2-40B4-BE49-F238E27FC236}">
+                <a16:creationId xmlns:a16="http://schemas.microsoft.com/office/drawing/2014/main" id="{C517151A-4CFE-3C37-141F-FC99BF0FD8C1}"/>
+              </a:ext>
+            </a:extLst>
+          </p:cNvPr>
+          <p:cNvSpPr/>
+          <p:nvPr/>
+        </p:nvSpPr>
+        <p:spPr>
+          <a:xfrm>
+            <a:off x="700477" y="1466527"/>
+            <a:ext cx="1661021" cy="678460"/>
+          </a:xfrm>
+          <a:prstGeom prst="flowChartProcess">
+            <a:avLst/>
+          </a:prstGeom>
+        </p:spPr>
+        <p:style>
+          <a:lnRef idx="2">
+            <a:schemeClr val="dk1"/>
+          </a:lnRef>
+          <a:fillRef idx="1">
+            <a:schemeClr val="lt1"/>
+          </a:fillRef>
+          <a:effectRef idx="0">
+            <a:schemeClr val="dk1"/>
+          </a:effectRef>
+          <a:fontRef idx="minor">
+            <a:schemeClr val="dk1"/>
+          </a:fontRef>
+        </p:style>
+        <p:txBody>
+          <a:bodyPr rtlCol="0" anchor="ctr"/>
+          <a:lstStyle/>
+          <a:p>
+            <a:pPr algn="ctr"/>
+            <a:r>
+              <a:rPr lang="en-US" dirty="0"/>
+              <a:t>MQTT Device</a:t>
+            </a:r>
+          </a:p>
+          <a:p>
+            <a:pPr algn="ctr"/>
+            <a:r>
+              <a:rPr lang="en-US" dirty="0"/>
+              <a:t>Client</a:t>
+            </a:r>
+          </a:p>
+        </p:txBody>
+      </p:sp>
+      <p:sp>
+        <p:nvSpPr>
+          <p:cNvPr id="17" name="Flowchart: Process 16">
+            <a:extLst>
+              <a:ext uri="{FF2B5EF4-FFF2-40B4-BE49-F238E27FC236}">
+                <a16:creationId xmlns:a16="http://schemas.microsoft.com/office/drawing/2014/main" id="{F5873FF5-70F8-8E15-4E25-7C0B5FEF7BBC}"/>
+              </a:ext>
+            </a:extLst>
+          </p:cNvPr>
+          <p:cNvSpPr/>
+          <p:nvPr/>
+        </p:nvSpPr>
+        <p:spPr>
+          <a:xfrm>
+            <a:off x="3154261" y="1466526"/>
+            <a:ext cx="1786854" cy="673970"/>
+          </a:xfrm>
+          <a:prstGeom prst="flowChartProcess">
+            <a:avLst/>
+          </a:prstGeom>
+        </p:spPr>
+        <p:style>
+          <a:lnRef idx="2">
+            <a:schemeClr val="dk1"/>
+          </a:lnRef>
+          <a:fillRef idx="1">
+            <a:schemeClr val="lt1"/>
+          </a:fillRef>
+          <a:effectRef idx="0">
+            <a:schemeClr val="dk1"/>
+          </a:effectRef>
+          <a:fontRef idx="minor">
+            <a:schemeClr val="dk1"/>
+          </a:fontRef>
+        </p:style>
+        <p:txBody>
+          <a:bodyPr rtlCol="0" anchor="ctr"/>
+          <a:lstStyle/>
+          <a:p>
+            <a:pPr algn="ctr"/>
+            <a:r>
+              <a:rPr lang="en-US" dirty="0"/>
+              <a:t>MQTT API</a:t>
+            </a:r>
+          </a:p>
+        </p:txBody>
+      </p:sp>
+      <p:sp>
+        <p:nvSpPr>
+          <p:cNvPr id="18" name="Arrow: Left 17">
+            <a:extLst>
+              <a:ext uri="{FF2B5EF4-FFF2-40B4-BE49-F238E27FC236}">
+                <a16:creationId xmlns:a16="http://schemas.microsoft.com/office/drawing/2014/main" id="{289293D5-4885-1354-C8FB-CFB8BD6B773D}"/>
+              </a:ext>
+            </a:extLst>
+          </p:cNvPr>
+          <p:cNvSpPr/>
+          <p:nvPr/>
+        </p:nvSpPr>
+        <p:spPr>
+          <a:xfrm>
+            <a:off x="2403440" y="1774476"/>
+            <a:ext cx="708877" cy="88884"/>
+          </a:xfrm>
+          <a:prstGeom prst="leftArrow">
+            <a:avLst/>
+          </a:prstGeom>
+        </p:spPr>
+        <p:style>
+          <a:lnRef idx="2">
+            <a:schemeClr val="dk1"/>
+          </a:lnRef>
+          <a:fillRef idx="1">
+            <a:schemeClr val="lt1"/>
+          </a:fillRef>
+          <a:effectRef idx="0">
+            <a:schemeClr val="dk1"/>
+          </a:effectRef>
+          <a:fontRef idx="minor">
+            <a:schemeClr val="dk1"/>
+          </a:fontRef>
+        </p:style>
+        <p:txBody>
+          <a:bodyPr rtlCol="0" anchor="ctr"/>
+          <a:lstStyle/>
+          <a:p>
+            <a:pPr algn="ctr"/>
+            <a:endParaRPr lang="en-US"/>
+          </a:p>
+        </p:txBody>
+      </p:sp>
+      <p:sp>
+        <p:nvSpPr>
+          <p:cNvPr id="19" name="Arrow: Left 18">
+            <a:extLst>
+              <a:ext uri="{FF2B5EF4-FFF2-40B4-BE49-F238E27FC236}">
+                <a16:creationId xmlns:a16="http://schemas.microsoft.com/office/drawing/2014/main" id="{ED1693B6-F730-513A-E772-862C7AACBCB1}"/>
+              </a:ext>
+            </a:extLst>
+          </p:cNvPr>
+          <p:cNvSpPr/>
+          <p:nvPr/>
+        </p:nvSpPr>
+        <p:spPr>
+          <a:xfrm flipV="1">
+            <a:off x="2241955" y="4453214"/>
+            <a:ext cx="1678278" cy="94005"/>
+          </a:xfrm>
+          <a:prstGeom prst="leftArrow">
+            <a:avLst/>
+          </a:prstGeom>
+        </p:spPr>
+        <p:style>
+          <a:lnRef idx="2">
+            <a:schemeClr val="dk1"/>
+          </a:lnRef>
+          <a:fillRef idx="1">
+            <a:schemeClr val="lt1"/>
+          </a:fillRef>
+          <a:effectRef idx="0">
+            <a:schemeClr val="dk1"/>
+          </a:effectRef>
+          <a:fontRef idx="minor">
+            <a:schemeClr val="dk1"/>
+          </a:fontRef>
+        </p:style>
+        <p:txBody>
+          <a:bodyPr rtlCol="0" anchor="ctr"/>
+          <a:lstStyle/>
+          <a:p>
+            <a:pPr algn="ctr"/>
+            <a:endParaRPr lang="en-US"/>
+          </a:p>
+        </p:txBody>
+      </p:sp>
+      <p:sp>
+        <p:nvSpPr>
+          <p:cNvPr id="13" name="Arrow: Right 12">
+            <a:extLst>
+              <a:ext uri="{FF2B5EF4-FFF2-40B4-BE49-F238E27FC236}">
+                <a16:creationId xmlns:a16="http://schemas.microsoft.com/office/drawing/2014/main" id="{2A67471E-E122-D295-CF99-717E9C7DD0DD}"/>
+              </a:ext>
+            </a:extLst>
+          </p:cNvPr>
+          <p:cNvSpPr/>
+          <p:nvPr/>
+        </p:nvSpPr>
+        <p:spPr>
+          <a:xfrm>
+            <a:off x="7960134" y="4401085"/>
+            <a:ext cx="1504925" cy="114966"/>
+          </a:xfrm>
+          <a:prstGeom prst="rightArrow">
+            <a:avLst/>
+          </a:prstGeom>
+        </p:spPr>
+        <p:style>
+          <a:lnRef idx="2">
+            <a:schemeClr val="dk1"/>
+          </a:lnRef>
+          <a:fillRef idx="1">
+            <a:schemeClr val="lt1"/>
+          </a:fillRef>
+          <a:effectRef idx="0">
+            <a:schemeClr val="dk1"/>
+          </a:effectRef>
+          <a:fontRef idx="minor">
+            <a:schemeClr val="dk1"/>
+          </a:fontRef>
+        </p:style>
+        <p:txBody>
+          <a:bodyPr rtlCol="0" anchor="ctr"/>
+          <a:lstStyle/>
+          <a:p>
+            <a:pPr algn="ctr"/>
+            <a:endParaRPr lang="en-US"/>
+          </a:p>
+        </p:txBody>
+      </p:sp>
+      <p:sp>
+        <p:nvSpPr>
+          <p:cNvPr id="23" name="Arrow: Right 22">
+            <a:extLst>
+              <a:ext uri="{FF2B5EF4-FFF2-40B4-BE49-F238E27FC236}">
+                <a16:creationId xmlns:a16="http://schemas.microsoft.com/office/drawing/2014/main" id="{EE1C698A-BD48-9C42-1ECA-172FDF833A0E}"/>
+              </a:ext>
+            </a:extLst>
+          </p:cNvPr>
+          <p:cNvSpPr/>
+          <p:nvPr/>
+        </p:nvSpPr>
+        <p:spPr>
+          <a:xfrm>
+            <a:off x="2230696" y="4059249"/>
+            <a:ext cx="4962042" cy="94007"/>
+          </a:xfrm>
+          <a:prstGeom prst="rightArrow">
+            <a:avLst/>
+          </a:prstGeom>
+        </p:spPr>
+        <p:style>
+          <a:lnRef idx="2">
+            <a:schemeClr val="dk1"/>
+          </a:lnRef>
+          <a:fillRef idx="1">
+            <a:schemeClr val="lt1"/>
+          </a:fillRef>
+          <a:effectRef idx="0">
+            <a:schemeClr val="dk1"/>
+          </a:effectRef>
+          <a:fontRef idx="minor">
+            <a:schemeClr val="dk1"/>
+          </a:fontRef>
+        </p:style>
+        <p:txBody>
+          <a:bodyPr rtlCol="0" anchor="ctr"/>
+          <a:lstStyle/>
+          <a:p>
+            <a:pPr algn="ctr"/>
+            <a:endParaRPr lang="en-US"/>
           </a:p>
         </p:txBody>
       </p:sp>
     </p:spTree>
     <p:extLst>
       <p:ext uri="{BB962C8B-B14F-4D97-AF65-F5344CB8AC3E}">
-        <p14:creationId xmlns:p14="http://schemas.microsoft.com/office/powerpoint/2010/main" val="752022997"/>
+        <p14:creationId xmlns:p14="http://schemas.microsoft.com/office/powerpoint/2010/main" val="3282667405"/>
       </p:ext>
     </p:extLst>
   </p:cSld>
@@ -3504,7 +4929,7 @@
             </a:pPr>
             <a:r>
               <a:rPr lang="en-US" dirty="0"/>
-              <a:t>Live Data Providing Model</a:t>
+              <a:t>Dynamic Data Providing Model</a:t>
             </a:r>
           </a:p>
         </p:txBody>
@@ -3523,8 +4948,8 @@
         </p:nvSpPr>
         <p:spPr>
           <a:xfrm>
-            <a:off x="1224791" y="4060272"/>
-            <a:ext cx="805345" cy="2418695"/>
+            <a:off x="9624927" y="4060272"/>
+            <a:ext cx="1042372" cy="2418695"/>
           </a:xfrm>
           <a:prstGeom prst="rect">
             <a:avLst/>
@@ -3570,8 +4995,8 @@
         </p:nvSpPr>
         <p:spPr>
           <a:xfrm>
-            <a:off x="2474750" y="4060272"/>
-            <a:ext cx="805344" cy="2418695"/>
+            <a:off x="10857793" y="4060272"/>
+            <a:ext cx="995839" cy="2418695"/>
           </a:xfrm>
           <a:prstGeom prst="rect">
             <a:avLst/>
@@ -3617,8 +5042,8 @@
         </p:nvSpPr>
         <p:spPr>
           <a:xfrm>
-            <a:off x="1224791" y="4060272"/>
-            <a:ext cx="805345" cy="939567"/>
+            <a:off x="9624926" y="4060272"/>
+            <a:ext cx="1042373" cy="939567"/>
           </a:xfrm>
           <a:prstGeom prst="rect">
             <a:avLst/>
@@ -3647,7 +5072,7 @@
             <a:pPr algn="ctr"/>
             <a:r>
               <a:rPr lang="en-US" dirty="0"/>
-              <a:t>Live Data</a:t>
+              <a:t>Dynamic Data</a:t>
             </a:r>
           </a:p>
         </p:txBody>
@@ -3666,8 +5091,8 @@
         </p:nvSpPr>
         <p:spPr>
           <a:xfrm>
-            <a:off x="2474750" y="4060272"/>
-            <a:ext cx="805344" cy="939567"/>
+            <a:off x="10857793" y="4060272"/>
+            <a:ext cx="995840" cy="939567"/>
           </a:xfrm>
           <a:prstGeom prst="rect">
             <a:avLst/>
@@ -3696,7 +5121,7 @@
             <a:pPr algn="ctr"/>
             <a:r>
               <a:rPr lang="en-US" dirty="0"/>
-              <a:t>Live Data</a:t>
+              <a:t>Dynamic Data</a:t>
             </a:r>
           </a:p>
         </p:txBody>
@@ -3715,7 +5140,7 @@
         </p:nvSpPr>
         <p:spPr>
           <a:xfrm>
-            <a:off x="4686649" y="4321878"/>
+            <a:off x="3934612" y="4321878"/>
             <a:ext cx="3973584" cy="1560353"/>
           </a:xfrm>
           <a:prstGeom prst="rect">
@@ -3741,6 +5166,14 @@
           <a:lstStyle/>
           <a:p>
             <a:pPr algn="ctr"/>
+            <a:endParaRPr lang="en-US" dirty="0"/>
+          </a:p>
+          <a:p>
+            <a:pPr algn="ctr"/>
+            <a:endParaRPr lang="en-US" dirty="0"/>
+          </a:p>
+          <a:p>
+            <a:pPr algn="ctr"/>
             <a:r>
               <a:rPr lang="en-US" dirty="0"/>
               <a:t>Worker Service</a:t>
@@ -3762,8 +5195,8 @@
         </p:nvSpPr>
         <p:spPr>
           <a:xfrm flipV="1">
-            <a:off x="3479334" y="5377342"/>
-            <a:ext cx="1140902" cy="125835"/>
+            <a:off x="7955270" y="4840152"/>
+            <a:ext cx="1504925" cy="114965"/>
           </a:xfrm>
           <a:prstGeom prst="leftArrow">
             <a:avLst/>
@@ -3806,7 +5239,7 @@
         </p:nvSpPr>
         <p:spPr>
           <a:xfrm>
-            <a:off x="3412921" y="5503178"/>
+            <a:off x="8242720" y="4463355"/>
             <a:ext cx="1031846" cy="369332"/>
           </a:xfrm>
           <a:prstGeom prst="rect">
@@ -3841,8 +5274,8 @@
         </p:nvSpPr>
         <p:spPr>
           <a:xfrm>
-            <a:off x="1098956" y="3731004"/>
-            <a:ext cx="2313965" cy="2904688"/>
+            <a:off x="9525353" y="3731004"/>
+            <a:ext cx="2428959" cy="2904688"/>
           </a:xfrm>
           <a:prstGeom prst="flowChartProcess">
             <a:avLst/>
@@ -3876,10 +5309,10 @@
       </p:sp>
       <p:sp>
         <p:nvSpPr>
-          <p:cNvPr id="21" name="TextBox 20">
-            <a:extLst>
-              <a:ext uri="{FF2B5EF4-FFF2-40B4-BE49-F238E27FC236}">
-                <a16:creationId xmlns:a16="http://schemas.microsoft.com/office/drawing/2014/main" id="{89B277DA-1B03-6579-061B-1D2A330125F9}"/>
+          <p:cNvPr id="24" name="TextBox 23">
+            <a:extLst>
+              <a:ext uri="{FF2B5EF4-FFF2-40B4-BE49-F238E27FC236}">
+                <a16:creationId xmlns:a16="http://schemas.microsoft.com/office/drawing/2014/main" id="{C90D6EA0-8B76-D0F0-D554-89C4C7C5F7EE}"/>
               </a:ext>
             </a:extLst>
           </p:cNvPr>
@@ -3888,8 +5321,8 @@
         </p:nvSpPr>
         <p:spPr>
           <a:xfrm>
-            <a:off x="3391599" y="5742264"/>
-            <a:ext cx="1295049" cy="369332"/>
+            <a:off x="8240034" y="4848636"/>
+            <a:ext cx="1140902" cy="369332"/>
           </a:xfrm>
           <a:prstGeom prst="rect">
             <a:avLst/>
@@ -3904,17 +5337,17 @@
           <a:p>
             <a:r>
               <a:rPr lang="en-US" dirty="0"/>
-              <a:t>1x200 msec</a:t>
-            </a:r>
-          </a:p>
-        </p:txBody>
-      </p:sp>
-      <p:sp>
-        <p:nvSpPr>
-          <p:cNvPr id="22" name="Arrow: Right 21">
-            <a:extLst>
-              <a:ext uri="{FF2B5EF4-FFF2-40B4-BE49-F238E27FC236}">
-                <a16:creationId xmlns:a16="http://schemas.microsoft.com/office/drawing/2014/main" id="{BD09A430-20F1-7ACF-2350-840E432DD2D1}"/>
+              <a:t>Response</a:t>
+            </a:r>
+          </a:p>
+        </p:txBody>
+      </p:sp>
+      <p:sp>
+        <p:nvSpPr>
+          <p:cNvPr id="26" name="Arrow: Right 25">
+            <a:extLst>
+              <a:ext uri="{FF2B5EF4-FFF2-40B4-BE49-F238E27FC236}">
+                <a16:creationId xmlns:a16="http://schemas.microsoft.com/office/drawing/2014/main" id="{81C2F11B-5B22-86BC-0CAF-60CD9389C849}"/>
               </a:ext>
             </a:extLst>
           </p:cNvPr>
@@ -3923,8 +5356,8 @@
         </p:nvSpPr>
         <p:spPr>
           <a:xfrm>
-            <a:off x="3479334" y="4541089"/>
-            <a:ext cx="1140902" cy="114802"/>
+            <a:off x="2230694" y="3915097"/>
+            <a:ext cx="2239865" cy="88884"/>
           </a:xfrm>
           <a:prstGeom prst="rightArrow">
             <a:avLst/>
@@ -3955,45 +5388,10 @@
       </p:sp>
       <p:sp>
         <p:nvSpPr>
-          <p:cNvPr id="24" name="TextBox 23">
-            <a:extLst>
-              <a:ext uri="{FF2B5EF4-FFF2-40B4-BE49-F238E27FC236}">
-                <a16:creationId xmlns:a16="http://schemas.microsoft.com/office/drawing/2014/main" id="{C90D6EA0-8B76-D0F0-D554-89C4C7C5F7EE}"/>
-              </a:ext>
-            </a:extLst>
-          </p:cNvPr>
-          <p:cNvSpPr txBox="1"/>
-          <p:nvPr/>
-        </p:nvSpPr>
-        <p:spPr>
-          <a:xfrm>
-            <a:off x="3438093" y="4219447"/>
-            <a:ext cx="1140902" cy="369332"/>
-          </a:xfrm>
-          <a:prstGeom prst="rect">
-            <a:avLst/>
-          </a:prstGeom>
-          <a:noFill/>
-        </p:spPr>
-        <p:txBody>
-          <a:bodyPr wrap="square" rtlCol="0">
-            <a:spAutoFit/>
-          </a:bodyPr>
-          <a:lstStyle/>
-          <a:p>
-            <a:r>
-              <a:rPr lang="en-US" dirty="0"/>
-              <a:t>Response</a:t>
-            </a:r>
-          </a:p>
-        </p:txBody>
-      </p:sp>
-      <p:sp>
-        <p:nvSpPr>
-          <p:cNvPr id="26" name="Arrow: Right 25">
-            <a:extLst>
-              <a:ext uri="{FF2B5EF4-FFF2-40B4-BE49-F238E27FC236}">
-                <a16:creationId xmlns:a16="http://schemas.microsoft.com/office/drawing/2014/main" id="{81C2F11B-5B22-86BC-0CAF-60CD9389C849}"/>
+          <p:cNvPr id="27" name="Rectangle 26">
+            <a:extLst>
+              <a:ext uri="{FF2B5EF4-FFF2-40B4-BE49-F238E27FC236}">
+                <a16:creationId xmlns:a16="http://schemas.microsoft.com/office/drawing/2014/main" id="{F5C39E6A-077F-D32D-5934-0ACC3059F540}"/>
               </a:ext>
             </a:extLst>
           </p:cNvPr>
@@ -4002,10 +5400,10 @@
         </p:nvSpPr>
         <p:spPr>
           <a:xfrm>
-            <a:off x="8726646" y="4941116"/>
-            <a:ext cx="1375803" cy="98019"/>
-          </a:xfrm>
-          <a:prstGeom prst="rightArrow">
+            <a:off x="752208" y="3731004"/>
+            <a:ext cx="1444303" cy="2747963"/>
+          </a:xfrm>
+          <a:prstGeom prst="rect">
             <a:avLst/>
           </a:prstGeom>
         </p:spPr>
@@ -4034,10 +5432,10 @@
       </p:sp>
       <p:sp>
         <p:nvSpPr>
-          <p:cNvPr id="27" name="Rectangle 26">
-            <a:extLst>
-              <a:ext uri="{FF2B5EF4-FFF2-40B4-BE49-F238E27FC236}">
-                <a16:creationId xmlns:a16="http://schemas.microsoft.com/office/drawing/2014/main" id="{F5C39E6A-077F-D32D-5934-0ACC3059F540}"/>
+          <p:cNvPr id="28" name="Rectangle 27">
+            <a:extLst>
+              <a:ext uri="{FF2B5EF4-FFF2-40B4-BE49-F238E27FC236}">
+                <a16:creationId xmlns:a16="http://schemas.microsoft.com/office/drawing/2014/main" id="{D61AA68A-C3BE-6064-24FC-9A071A105F41}"/>
               </a:ext>
             </a:extLst>
           </p:cNvPr>
@@ -4046,51 +5444,7 @@
         </p:nvSpPr>
         <p:spPr>
           <a:xfrm>
-            <a:off x="10164666" y="3731004"/>
-            <a:ext cx="1444303" cy="2747963"/>
-          </a:xfrm>
-          <a:prstGeom prst="rect">
-            <a:avLst/>
-          </a:prstGeom>
-        </p:spPr>
-        <p:style>
-          <a:lnRef idx="2">
-            <a:schemeClr val="dk1"/>
-          </a:lnRef>
-          <a:fillRef idx="1">
-            <a:schemeClr val="lt1"/>
-          </a:fillRef>
-          <a:effectRef idx="0">
-            <a:schemeClr val="dk1"/>
-          </a:effectRef>
-          <a:fontRef idx="minor">
-            <a:schemeClr val="dk1"/>
-          </a:fontRef>
-        </p:style>
-        <p:txBody>
-          <a:bodyPr rtlCol="0" anchor="ctr"/>
-          <a:lstStyle/>
-          <a:p>
-            <a:pPr algn="ctr"/>
-            <a:endParaRPr lang="en-US"/>
-          </a:p>
-        </p:txBody>
-      </p:sp>
-      <p:sp>
-        <p:nvSpPr>
-          <p:cNvPr id="28" name="Rectangle 27">
-            <a:extLst>
-              <a:ext uri="{FF2B5EF4-FFF2-40B4-BE49-F238E27FC236}">
-                <a16:creationId xmlns:a16="http://schemas.microsoft.com/office/drawing/2014/main" id="{D61AA68A-C3BE-6064-24FC-9A071A105F41}"/>
-              </a:ext>
-            </a:extLst>
-          </p:cNvPr>
-          <p:cNvSpPr/>
-          <p:nvPr/>
-        </p:nvSpPr>
-        <p:spPr>
-          <a:xfrm>
-            <a:off x="10164665" y="3731004"/>
+            <a:off x="752207" y="3731004"/>
             <a:ext cx="1444303" cy="924887"/>
           </a:xfrm>
           <a:prstGeom prst="rect">
@@ -4120,7 +5474,7 @@
             <a:pPr algn="ctr"/>
             <a:r>
               <a:rPr lang="en-US" dirty="0"/>
-              <a:t>Live Data</a:t>
+              <a:t>Dynamic Data</a:t>
             </a:r>
           </a:p>
         </p:txBody>
@@ -4139,7 +5493,7 @@
         </p:nvSpPr>
         <p:spPr>
           <a:xfrm>
-            <a:off x="9873846" y="3429000"/>
+            <a:off x="9771294" y="3429000"/>
             <a:ext cx="1996580" cy="369332"/>
           </a:xfrm>
           <a:prstGeom prst="rect">
@@ -4174,7 +5528,7 @@
         </p:nvSpPr>
         <p:spPr>
           <a:xfrm>
-            <a:off x="7071924" y="2785145"/>
+            <a:off x="6396796" y="2785145"/>
             <a:ext cx="2701254" cy="752912"/>
           </a:xfrm>
           <a:prstGeom prst="flowChartProcess">
@@ -4228,8 +5582,8 @@
         </p:nvSpPr>
         <p:spPr>
           <a:xfrm>
-            <a:off x="8380605" y="3624044"/>
-            <a:ext cx="92279" cy="612396"/>
+            <a:off x="7210145" y="3598204"/>
+            <a:ext cx="92279" cy="680181"/>
           </a:xfrm>
           <a:prstGeom prst="upArrow">
             <a:avLst/>
@@ -4323,8 +5677,8 @@
         </p:nvSpPr>
         <p:spPr>
           <a:xfrm>
-            <a:off x="8380605" y="2250347"/>
-            <a:ext cx="92279" cy="448811"/>
+            <a:off x="7918189" y="2250347"/>
+            <a:ext cx="87415" cy="469784"/>
           </a:xfrm>
           <a:prstGeom prst="upArrow">
             <a:avLst/>
@@ -4549,7 +5903,7 @@
         </p:nvSpPr>
         <p:spPr>
           <a:xfrm>
-            <a:off x="3489820" y="2785144"/>
+            <a:off x="2814692" y="2785144"/>
             <a:ext cx="2877423" cy="745277"/>
           </a:xfrm>
           <a:prstGeom prst="flowChartProcess">
@@ -4603,8 +5957,8 @@
         </p:nvSpPr>
         <p:spPr>
           <a:xfrm>
-            <a:off x="4848836" y="3624044"/>
-            <a:ext cx="92279" cy="612396"/>
+            <a:off x="4481362" y="3587045"/>
+            <a:ext cx="92279" cy="691340"/>
           </a:xfrm>
           <a:prstGeom prst="upArrow">
             <a:avLst/>
@@ -4836,8 +6190,8 @@
         </p:nvSpPr>
         <p:spPr>
           <a:xfrm flipV="1">
-            <a:off x="8502948" y="4060271"/>
-            <a:ext cx="1599501" cy="98019"/>
+            <a:off x="2222150" y="4412135"/>
+            <a:ext cx="1678278" cy="94005"/>
           </a:xfrm>
           <a:prstGeom prst="leftArrow">
             <a:avLst/>
@@ -4866,10 +6220,237 @@
           </a:p>
         </p:txBody>
       </p:sp>
+      <p:sp>
+        <p:nvSpPr>
+          <p:cNvPr id="13" name="Arrow: Right 12">
+            <a:extLst>
+              <a:ext uri="{FF2B5EF4-FFF2-40B4-BE49-F238E27FC236}">
+                <a16:creationId xmlns:a16="http://schemas.microsoft.com/office/drawing/2014/main" id="{2A67471E-E122-D295-CF99-717E9C7DD0DD}"/>
+              </a:ext>
+            </a:extLst>
+          </p:cNvPr>
+          <p:cNvSpPr/>
+          <p:nvPr/>
+        </p:nvSpPr>
+        <p:spPr>
+          <a:xfrm>
+            <a:off x="7960134" y="4448058"/>
+            <a:ext cx="1504925" cy="121153"/>
+          </a:xfrm>
+          <a:prstGeom prst="rightArrow">
+            <a:avLst/>
+          </a:prstGeom>
+        </p:spPr>
+        <p:style>
+          <a:lnRef idx="2">
+            <a:schemeClr val="dk1"/>
+          </a:lnRef>
+          <a:fillRef idx="1">
+            <a:schemeClr val="lt1"/>
+          </a:fillRef>
+          <a:effectRef idx="0">
+            <a:schemeClr val="dk1"/>
+          </a:effectRef>
+          <a:fontRef idx="minor">
+            <a:schemeClr val="dk1"/>
+          </a:fontRef>
+        </p:style>
+        <p:txBody>
+          <a:bodyPr rtlCol="0" anchor="ctr"/>
+          <a:lstStyle/>
+          <a:p>
+            <a:pPr algn="ctr"/>
+            <a:endParaRPr lang="en-US"/>
+          </a:p>
+        </p:txBody>
+      </p:sp>
+      <p:sp>
+        <p:nvSpPr>
+          <p:cNvPr id="16" name="Arrow: Down 15">
+            <a:extLst>
+              <a:ext uri="{FF2B5EF4-FFF2-40B4-BE49-F238E27FC236}">
+                <a16:creationId xmlns:a16="http://schemas.microsoft.com/office/drawing/2014/main" id="{98AFCBBA-AB74-1E84-2105-DF052AC24069}"/>
+              </a:ext>
+            </a:extLst>
+          </p:cNvPr>
+          <p:cNvSpPr/>
+          <p:nvPr/>
+        </p:nvSpPr>
+        <p:spPr>
+          <a:xfrm>
+            <a:off x="8749953" y="2234119"/>
+            <a:ext cx="92278" cy="486012"/>
+          </a:xfrm>
+          <a:prstGeom prst="downArrow">
+            <a:avLst/>
+          </a:prstGeom>
+        </p:spPr>
+        <p:style>
+          <a:lnRef idx="2">
+            <a:schemeClr val="dk1"/>
+          </a:lnRef>
+          <a:fillRef idx="1">
+            <a:schemeClr val="lt1"/>
+          </a:fillRef>
+          <a:effectRef idx="0">
+            <a:schemeClr val="dk1"/>
+          </a:effectRef>
+          <a:fontRef idx="minor">
+            <a:schemeClr val="dk1"/>
+          </a:fontRef>
+        </p:style>
+        <p:txBody>
+          <a:bodyPr rtlCol="0" anchor="ctr"/>
+          <a:lstStyle/>
+          <a:p>
+            <a:pPr algn="ctr"/>
+            <a:endParaRPr lang="en-US"/>
+          </a:p>
+        </p:txBody>
+      </p:sp>
+      <p:sp>
+        <p:nvSpPr>
+          <p:cNvPr id="23" name="Arrow: Right 22">
+            <a:extLst>
+              <a:ext uri="{FF2B5EF4-FFF2-40B4-BE49-F238E27FC236}">
+                <a16:creationId xmlns:a16="http://schemas.microsoft.com/office/drawing/2014/main" id="{EE1C698A-BD48-9C42-1ECA-172FDF833A0E}"/>
+              </a:ext>
+            </a:extLst>
+          </p:cNvPr>
+          <p:cNvSpPr/>
+          <p:nvPr/>
+        </p:nvSpPr>
+        <p:spPr>
+          <a:xfrm>
+            <a:off x="2230696" y="4059249"/>
+            <a:ext cx="4962042" cy="94007"/>
+          </a:xfrm>
+          <a:prstGeom prst="rightArrow">
+            <a:avLst/>
+          </a:prstGeom>
+        </p:spPr>
+        <p:style>
+          <a:lnRef idx="2">
+            <a:schemeClr val="dk1"/>
+          </a:lnRef>
+          <a:fillRef idx="1">
+            <a:schemeClr val="lt1"/>
+          </a:fillRef>
+          <a:effectRef idx="0">
+            <a:schemeClr val="dk1"/>
+          </a:effectRef>
+          <a:fontRef idx="minor">
+            <a:schemeClr val="dk1"/>
+          </a:fontRef>
+        </p:style>
+        <p:txBody>
+          <a:bodyPr rtlCol="0" anchor="ctr"/>
+          <a:lstStyle/>
+          <a:p>
+            <a:pPr algn="ctr"/>
+            <a:endParaRPr lang="en-US"/>
+          </a:p>
+        </p:txBody>
+      </p:sp>
+      <p:sp>
+        <p:nvSpPr>
+          <p:cNvPr id="22" name="Arrow: Bent-Up 21">
+            <a:extLst>
+              <a:ext uri="{FF2B5EF4-FFF2-40B4-BE49-F238E27FC236}">
+                <a16:creationId xmlns:a16="http://schemas.microsoft.com/office/drawing/2014/main" id="{4FDA9749-19C2-2130-BEB0-31CE89E10E60}"/>
+              </a:ext>
+            </a:extLst>
+          </p:cNvPr>
+          <p:cNvSpPr/>
+          <p:nvPr/>
+        </p:nvSpPr>
+        <p:spPr>
+          <a:xfrm rot="5400000">
+            <a:off x="8741508" y="3631815"/>
+            <a:ext cx="752913" cy="685692"/>
+          </a:xfrm>
+          <a:prstGeom prst="bentUpArrow">
+            <a:avLst>
+              <a:gd name="adj1" fmla="val 9475"/>
+              <a:gd name="adj2" fmla="val 8175"/>
+              <a:gd name="adj3" fmla="val 11031"/>
+            </a:avLst>
+          </a:prstGeom>
+        </p:spPr>
+        <p:style>
+          <a:lnRef idx="2">
+            <a:schemeClr val="dk1"/>
+          </a:lnRef>
+          <a:fillRef idx="1">
+            <a:schemeClr val="lt1"/>
+          </a:fillRef>
+          <a:effectRef idx="0">
+            <a:schemeClr val="dk1"/>
+          </a:effectRef>
+          <a:fontRef idx="minor">
+            <a:schemeClr val="dk1"/>
+          </a:fontRef>
+        </p:style>
+        <p:txBody>
+          <a:bodyPr rtlCol="0" anchor="ctr"/>
+          <a:lstStyle/>
+          <a:p>
+            <a:pPr algn="ctr"/>
+            <a:endParaRPr lang="en-US"/>
+          </a:p>
+        </p:txBody>
+      </p:sp>
+      <p:sp>
+        <p:nvSpPr>
+          <p:cNvPr id="39" name="Rectangle 38">
+            <a:extLst>
+              <a:ext uri="{FF2B5EF4-FFF2-40B4-BE49-F238E27FC236}">
+                <a16:creationId xmlns:a16="http://schemas.microsoft.com/office/drawing/2014/main" id="{B0ED4530-3ECA-38BC-94B6-725DC5863608}"/>
+              </a:ext>
+            </a:extLst>
+          </p:cNvPr>
+          <p:cNvSpPr/>
+          <p:nvPr/>
+        </p:nvSpPr>
+        <p:spPr>
+          <a:xfrm>
+            <a:off x="3934611" y="4321877"/>
+            <a:ext cx="3973583" cy="677962"/>
+          </a:xfrm>
+          <a:prstGeom prst="rect">
+            <a:avLst/>
+          </a:prstGeom>
+        </p:spPr>
+        <p:style>
+          <a:lnRef idx="2">
+            <a:schemeClr val="dk1"/>
+          </a:lnRef>
+          <a:fillRef idx="1">
+            <a:schemeClr val="lt1"/>
+          </a:fillRef>
+          <a:effectRef idx="0">
+            <a:schemeClr val="dk1"/>
+          </a:effectRef>
+          <a:fontRef idx="minor">
+            <a:schemeClr val="dk1"/>
+          </a:fontRef>
+        </p:style>
+        <p:txBody>
+          <a:bodyPr rtlCol="0" anchor="ctr"/>
+          <a:lstStyle/>
+          <a:p>
+            <a:pPr algn="ctr"/>
+            <a:r>
+              <a:rPr lang="en-US" dirty="0"/>
+              <a:t>Dynamic Data Service</a:t>
+            </a:r>
+          </a:p>
+        </p:txBody>
+      </p:sp>
     </p:spTree>
     <p:extLst>
       <p:ext uri="{BB962C8B-B14F-4D97-AF65-F5344CB8AC3E}">
-        <p14:creationId xmlns:p14="http://schemas.microsoft.com/office/powerpoint/2010/main" val="1270557920"/>
+        <p14:creationId xmlns:p14="http://schemas.microsoft.com/office/powerpoint/2010/main" val="3237931525"/>
       </p:ext>
     </p:extLst>
   </p:cSld>
@@ -5175,21 +6756,6 @@
 </file>
 
 <file path=customXml/item1.xml><?xml version="1.0" encoding="utf-8"?>
-<p:properties xmlns:p="http://schemas.microsoft.com/office/2006/metadata/properties" xmlns:xsi="http://www.w3.org/2001/XMLSchema-instance" xmlns:pc="http://schemas.microsoft.com/office/infopath/2007/PartnerControls">
-  <documentManagement/>
-</p:properties>
-</file>
-
-<file path=customXml/item2.xml><?xml version="1.0" encoding="utf-8"?>
-<?mso-contentType ?>
-<FormTemplates xmlns="http://schemas.microsoft.com/sharepoint/v3/contenttype/forms">
-  <Display>DocumentLibraryForm</Display>
-  <Edit>DocumentLibraryForm</Edit>
-  <New>DocumentLibraryForm</New>
-</FormTemplates>
-</file>
-
-<file path=customXml/item3.xml><?xml version="1.0" encoding="utf-8"?>
 <ct:contentTypeSchema xmlns:ct="http://schemas.microsoft.com/office/2006/metadata/contentType" xmlns:ma="http://schemas.microsoft.com/office/2006/metadata/properties/metaAttributes" ct:_="" ma:_="" ma:contentTypeName="Dokument" ma:contentTypeID="0x010100023996653EDF394BA23888B596ABB13B" ma:contentTypeVersion="0" ma:contentTypeDescription="Ein neues Dokument erstellen." ma:contentTypeScope="" ma:versionID="6e569625767f4f619915f48d9d5fd167">
   <xsd:schema xmlns:xsd="http://www.w3.org/2001/XMLSchema" xmlns:xs="http://www.w3.org/2001/XMLSchema" xmlns:p="http://schemas.microsoft.com/office/2006/metadata/properties" targetNamespace="http://schemas.microsoft.com/office/2006/metadata/properties" ma:root="true" ma:fieldsID="855d5e9f230bd55b50e0337123bccb49">
     <xsd:element name="properties">
@@ -5303,17 +6869,33 @@
 </ct:contentTypeSchema>
 </file>
 
+<file path=customXml/item2.xml><?xml version="1.0" encoding="utf-8"?>
+<?mso-contentType ?>
+<FormTemplates xmlns="http://schemas.microsoft.com/sharepoint/v3/contenttype/forms">
+  <Display>DocumentLibraryForm</Display>
+  <Edit>DocumentLibraryForm</Edit>
+  <New>DocumentLibraryForm</New>
+</FormTemplates>
+</file>
+
+<file path=customXml/item3.xml><?xml version="1.0" encoding="utf-8"?>
+<p:properties xmlns:p="http://schemas.microsoft.com/office/2006/metadata/properties" xmlns:xsi="http://www.w3.org/2001/XMLSchema-instance" xmlns:pc="http://schemas.microsoft.com/office/infopath/2007/PartnerControls">
+  <documentManagement/>
+</p:properties>
+</file>
+
 <file path=customXml/itemProps1.xml><?xml version="1.0" encoding="utf-8"?>
-<ds:datastoreItem xmlns:ds="http://schemas.openxmlformats.org/officeDocument/2006/customXml" ds:itemID="{57AFB4E6-F59C-4146-809C-88D066DB3D27}">
+<ds:datastoreItem xmlns:ds="http://schemas.openxmlformats.org/officeDocument/2006/customXml" ds:itemID="{9A029B97-E4A3-4671-BCBA-4D6BD1C330C4}">
   <ds:schemaRefs>
+    <ds:schemaRef ds:uri="http://schemas.microsoft.com/office/2006/metadata/contentType"/>
+    <ds:schemaRef ds:uri="http://schemas.microsoft.com/office/2006/metadata/properties/metaAttributes"/>
+    <ds:schemaRef ds:uri="http://www.w3.org/2001/XMLSchema"/>
+    <ds:schemaRef ds:uri="http://schemas.microsoft.com/office/2006/metadata/properties"/>
+    <ds:schemaRef ds:uri="http://schemas.openxmlformats.org/package/2006/metadata/core-properties"/>
     <ds:schemaRef ds:uri="http://purl.org/dc/elements/1.1/"/>
-    <ds:schemaRef ds:uri="http://schemas.microsoft.com/office/2006/metadata/properties"/>
     <ds:schemaRef ds:uri="http://purl.org/dc/terms/"/>
-    <ds:schemaRef ds:uri="http://schemas.openxmlformats.org/package/2006/metadata/core-properties"/>
-    <ds:schemaRef ds:uri="http://schemas.microsoft.com/office/2006/documentManagement/types"/>
+    <ds:schemaRef ds:uri="http://schemas.microsoft.com/internal/obd"/>
     <ds:schemaRef ds:uri="http://schemas.microsoft.com/office/infopath/2007/PartnerControls"/>
-    <ds:schemaRef ds:uri="http://www.w3.org/XML/1998/namespace"/>
-    <ds:schemaRef ds:uri="http://purl.org/dc/dcmitype/"/>
   </ds:schemaRefs>
 </ds:datastoreItem>
 </file>
@@ -5327,17 +6909,16 @@
 </file>
 
 <file path=customXml/itemProps3.xml><?xml version="1.0" encoding="utf-8"?>
-<ds:datastoreItem xmlns:ds="http://schemas.openxmlformats.org/officeDocument/2006/customXml" ds:itemID="{9A029B97-E4A3-4671-BCBA-4D6BD1C330C4}">
+<ds:datastoreItem xmlns:ds="http://schemas.openxmlformats.org/officeDocument/2006/customXml" ds:itemID="{57AFB4E6-F59C-4146-809C-88D066DB3D27}">
   <ds:schemaRefs>
-    <ds:schemaRef ds:uri="http://schemas.microsoft.com/office/2006/metadata/contentType"/>
-    <ds:schemaRef ds:uri="http://schemas.microsoft.com/office/2006/metadata/properties/metaAttributes"/>
-    <ds:schemaRef ds:uri="http://www.w3.org/2001/XMLSchema"/>
+    <ds:schemaRef ds:uri="http://purl.org/dc/elements/1.1/"/>
     <ds:schemaRef ds:uri="http://schemas.microsoft.com/office/2006/metadata/properties"/>
+    <ds:schemaRef ds:uri="http://purl.org/dc/terms/"/>
     <ds:schemaRef ds:uri="http://schemas.openxmlformats.org/package/2006/metadata/core-properties"/>
-    <ds:schemaRef ds:uri="http://purl.org/dc/elements/1.1/"/>
-    <ds:schemaRef ds:uri="http://purl.org/dc/terms/"/>
-    <ds:schemaRef ds:uri="http://schemas.microsoft.com/internal/obd"/>
+    <ds:schemaRef ds:uri="http://schemas.microsoft.com/office/2006/documentManagement/types"/>
     <ds:schemaRef ds:uri="http://schemas.microsoft.com/office/infopath/2007/PartnerControls"/>
+    <ds:schemaRef ds:uri="http://www.w3.org/XML/1998/namespace"/>
+    <ds:schemaRef ds:uri="http://purl.org/dc/dcmitype/"/>
   </ds:schemaRefs>
 </ds:datastoreItem>
 </file>
</xml_diff>

<commit_message>
Initial Commit for Dynamic Display component
</commit_message>
<xml_diff>
--- a/Presentation1.pptx
+++ b/Presentation1.pptx
@@ -7,6 +7,7 @@
   <p:sldIdLst>
     <p:sldId id="258" r:id="rId5"/>
     <p:sldId id="259" r:id="rId6"/>
+    <p:sldId id="260" r:id="rId7"/>
   </p:sldIdLst>
   <p:sldSz cx="12192000" cy="6858000"/>
   <p:notesSz cx="6858000" cy="9144000"/>
@@ -260,7 +261,7 @@
           <a:p>
             <a:fld id="{15D61805-E289-435F-9A60-4C8AC6F348D4}" type="datetimeFigureOut">
               <a:rPr lang="en-US" smtClean="0"/>
-              <a:t>5/12/2022</a:t>
+              <a:t>6/21/2022</a:t>
             </a:fld>
             <a:endParaRPr lang="en-US"/>
           </a:p>
@@ -458,7 +459,7 @@
           <a:p>
             <a:fld id="{15D61805-E289-435F-9A60-4C8AC6F348D4}" type="datetimeFigureOut">
               <a:rPr lang="en-US" smtClean="0"/>
-              <a:t>5/12/2022</a:t>
+              <a:t>6/21/2022</a:t>
             </a:fld>
             <a:endParaRPr lang="en-US"/>
           </a:p>
@@ -666,7 +667,7 @@
           <a:p>
             <a:fld id="{15D61805-E289-435F-9A60-4C8AC6F348D4}" type="datetimeFigureOut">
               <a:rPr lang="en-US" smtClean="0"/>
-              <a:t>5/12/2022</a:t>
+              <a:t>6/21/2022</a:t>
             </a:fld>
             <a:endParaRPr lang="en-US"/>
           </a:p>
@@ -864,7 +865,7 @@
           <a:p>
             <a:fld id="{15D61805-E289-435F-9A60-4C8AC6F348D4}" type="datetimeFigureOut">
               <a:rPr lang="en-US" smtClean="0"/>
-              <a:t>5/12/2022</a:t>
+              <a:t>6/21/2022</a:t>
             </a:fld>
             <a:endParaRPr lang="en-US"/>
           </a:p>
@@ -1139,7 +1140,7 @@
           <a:p>
             <a:fld id="{15D61805-E289-435F-9A60-4C8AC6F348D4}" type="datetimeFigureOut">
               <a:rPr lang="en-US" smtClean="0"/>
-              <a:t>5/12/2022</a:t>
+              <a:t>6/21/2022</a:t>
             </a:fld>
             <a:endParaRPr lang="en-US"/>
           </a:p>
@@ -1404,7 +1405,7 @@
           <a:p>
             <a:fld id="{15D61805-E289-435F-9A60-4C8AC6F348D4}" type="datetimeFigureOut">
               <a:rPr lang="en-US" smtClean="0"/>
-              <a:t>5/12/2022</a:t>
+              <a:t>6/21/2022</a:t>
             </a:fld>
             <a:endParaRPr lang="en-US"/>
           </a:p>
@@ -1816,7 +1817,7 @@
           <a:p>
             <a:fld id="{15D61805-E289-435F-9A60-4C8AC6F348D4}" type="datetimeFigureOut">
               <a:rPr lang="en-US" smtClean="0"/>
-              <a:t>5/12/2022</a:t>
+              <a:t>6/21/2022</a:t>
             </a:fld>
             <a:endParaRPr lang="en-US"/>
           </a:p>
@@ -1957,7 +1958,7 @@
           <a:p>
             <a:fld id="{15D61805-E289-435F-9A60-4C8AC6F348D4}" type="datetimeFigureOut">
               <a:rPr lang="en-US" smtClean="0"/>
-              <a:t>5/12/2022</a:t>
+              <a:t>6/21/2022</a:t>
             </a:fld>
             <a:endParaRPr lang="en-US"/>
           </a:p>
@@ -2070,7 +2071,7 @@
           <a:p>
             <a:fld id="{15D61805-E289-435F-9A60-4C8AC6F348D4}" type="datetimeFigureOut">
               <a:rPr lang="en-US" smtClean="0"/>
-              <a:t>5/12/2022</a:t>
+              <a:t>6/21/2022</a:t>
             </a:fld>
             <a:endParaRPr lang="en-US"/>
           </a:p>
@@ -2381,7 +2382,7 @@
           <a:p>
             <a:fld id="{15D61805-E289-435F-9A60-4C8AC6F348D4}" type="datetimeFigureOut">
               <a:rPr lang="en-US" smtClean="0"/>
-              <a:t>5/12/2022</a:t>
+              <a:t>6/21/2022</a:t>
             </a:fld>
             <a:endParaRPr lang="en-US"/>
           </a:p>
@@ -2669,7 +2670,7 @@
           <a:p>
             <a:fld id="{15D61805-E289-435F-9A60-4C8AC6F348D4}" type="datetimeFigureOut">
               <a:rPr lang="en-US" smtClean="0"/>
-              <a:t>5/12/2022</a:t>
+              <a:t>6/21/2022</a:t>
             </a:fld>
             <a:endParaRPr lang="en-US"/>
           </a:p>
@@ -2910,7 +2911,7 @@
           <a:p>
             <a:fld id="{15D61805-E289-435F-9A60-4C8AC6F348D4}" type="datetimeFigureOut">
               <a:rPr lang="en-US" smtClean="0"/>
-              <a:t>5/12/2022</a:t>
+              <a:t>6/21/2022</a:t>
             </a:fld>
             <a:endParaRPr lang="en-US"/>
           </a:p>
@@ -6594,6 +6595,2003 @@
 </p:sld>
 </file>
 
+<file path=ppt/slides/slide3.xml><?xml version="1.0" encoding="utf-8"?>
+<p:sld xmlns:a="http://schemas.openxmlformats.org/drawingml/2006/main" xmlns:r="http://schemas.openxmlformats.org/officeDocument/2006/relationships" xmlns:p="http://schemas.openxmlformats.org/presentationml/2006/main">
+  <p:cSld>
+    <p:spTree>
+      <p:nvGrpSpPr>
+        <p:cNvPr id="1" name=""/>
+        <p:cNvGrpSpPr/>
+        <p:nvPr/>
+      </p:nvGrpSpPr>
+      <p:grpSpPr>
+        <a:xfrm>
+          <a:off x="0" y="0"/>
+          <a:ext cx="0" cy="0"/>
+          <a:chOff x="0" y="0"/>
+          <a:chExt cx="0" cy="0"/>
+        </a:xfrm>
+      </p:grpSpPr>
+      <p:sp>
+        <p:nvSpPr>
+          <p:cNvPr id="2" name="Title 1">
+            <a:extLst>
+              <a:ext uri="{FF2B5EF4-FFF2-40B4-BE49-F238E27FC236}">
+                <a16:creationId xmlns:a16="http://schemas.microsoft.com/office/drawing/2014/main" id="{0FCDE5F0-B46A-7F18-6066-461FAC337044}"/>
+              </a:ext>
+            </a:extLst>
+          </p:cNvPr>
+          <p:cNvSpPr>
+            <a:spLocks noGrp="1"/>
+          </p:cNvSpPr>
+          <p:nvPr>
+            <p:ph type="title"/>
+          </p:nvPr>
+        </p:nvSpPr>
+        <p:spPr>
+          <a:xfrm>
+            <a:off x="838200" y="497205"/>
+            <a:ext cx="10515600" cy="76095"/>
+          </a:xfrm>
+        </p:spPr>
+        <p:txBody>
+          <a:bodyPr>
+            <a:normAutofit fontScale="90000"/>
+          </a:bodyPr>
+          <a:lstStyle/>
+          <a:p>
+            <a:br>
+              <a:rPr lang="en-US" dirty="0"/>
+            </a:br>
+            <a:endParaRPr lang="en-US" dirty="0"/>
+          </a:p>
+        </p:txBody>
+      </p:sp>
+      <p:sp>
+        <p:nvSpPr>
+          <p:cNvPr id="3" name="Content Placeholder 2">
+            <a:extLst>
+              <a:ext uri="{FF2B5EF4-FFF2-40B4-BE49-F238E27FC236}">
+                <a16:creationId xmlns:a16="http://schemas.microsoft.com/office/drawing/2014/main" id="{C66A27C2-DE94-AA11-0337-CF81B1C7396F}"/>
+              </a:ext>
+            </a:extLst>
+          </p:cNvPr>
+          <p:cNvSpPr>
+            <a:spLocks noGrp="1"/>
+          </p:cNvSpPr>
+          <p:nvPr>
+            <p:ph idx="1"/>
+          </p:nvPr>
+        </p:nvSpPr>
+        <p:spPr>
+          <a:xfrm>
+            <a:off x="151002" y="83891"/>
+            <a:ext cx="11903977" cy="6694414"/>
+          </a:xfrm>
+          <a:noFill/>
+        </p:spPr>
+        <p:style>
+          <a:lnRef idx="2">
+            <a:schemeClr val="dk1"/>
+          </a:lnRef>
+          <a:fillRef idx="1">
+            <a:schemeClr val="lt1"/>
+          </a:fillRef>
+          <a:effectRef idx="0">
+            <a:schemeClr val="dk1"/>
+          </a:effectRef>
+          <a:fontRef idx="minor">
+            <a:schemeClr val="dk1"/>
+          </a:fontRef>
+        </p:style>
+        <p:txBody>
+          <a:bodyPr>
+            <a:normAutofit/>
+          </a:bodyPr>
+          <a:lstStyle/>
+          <a:p>
+            <a:pPr marL="0" indent="0">
+              <a:buNone/>
+            </a:pPr>
+            <a:r>
+              <a:rPr lang="en-US" dirty="0"/>
+              <a:t>Dynamic Data Providing Model (DB as store)</a:t>
+            </a:r>
+          </a:p>
+        </p:txBody>
+      </p:sp>
+      <p:sp>
+        <p:nvSpPr>
+          <p:cNvPr id="6" name="Rectangle 5">
+            <a:extLst>
+              <a:ext uri="{FF2B5EF4-FFF2-40B4-BE49-F238E27FC236}">
+                <a16:creationId xmlns:a16="http://schemas.microsoft.com/office/drawing/2014/main" id="{26EB8145-A39C-35C5-BF5C-C6E05740A9D0}"/>
+              </a:ext>
+            </a:extLst>
+          </p:cNvPr>
+          <p:cNvSpPr/>
+          <p:nvPr/>
+        </p:nvSpPr>
+        <p:spPr>
+          <a:xfrm>
+            <a:off x="9624927" y="4060272"/>
+            <a:ext cx="1042372" cy="2418695"/>
+          </a:xfrm>
+          <a:prstGeom prst="rect">
+            <a:avLst/>
+          </a:prstGeom>
+        </p:spPr>
+        <p:style>
+          <a:lnRef idx="2">
+            <a:schemeClr val="dk1"/>
+          </a:lnRef>
+          <a:fillRef idx="1">
+            <a:schemeClr val="lt1"/>
+          </a:fillRef>
+          <a:effectRef idx="0">
+            <a:schemeClr val="dk1"/>
+          </a:effectRef>
+          <a:fontRef idx="minor">
+            <a:schemeClr val="dk1"/>
+          </a:fontRef>
+        </p:style>
+        <p:txBody>
+          <a:bodyPr rtlCol="0" anchor="ctr"/>
+          <a:lstStyle/>
+          <a:p>
+            <a:pPr algn="ctr"/>
+            <a:r>
+              <a:rPr lang="en-US" dirty="0"/>
+              <a:t>APC 1</a:t>
+            </a:r>
+          </a:p>
+        </p:txBody>
+      </p:sp>
+      <p:sp>
+        <p:nvSpPr>
+          <p:cNvPr id="7" name="Rectangle 6">
+            <a:extLst>
+              <a:ext uri="{FF2B5EF4-FFF2-40B4-BE49-F238E27FC236}">
+                <a16:creationId xmlns:a16="http://schemas.microsoft.com/office/drawing/2014/main" id="{A4480275-9CF1-FCD4-2E51-90E842F691C2}"/>
+              </a:ext>
+            </a:extLst>
+          </p:cNvPr>
+          <p:cNvSpPr/>
+          <p:nvPr/>
+        </p:nvSpPr>
+        <p:spPr>
+          <a:xfrm>
+            <a:off x="10857793" y="4060272"/>
+            <a:ext cx="995839" cy="2418695"/>
+          </a:xfrm>
+          <a:prstGeom prst="rect">
+            <a:avLst/>
+          </a:prstGeom>
+        </p:spPr>
+        <p:style>
+          <a:lnRef idx="2">
+            <a:schemeClr val="dk1"/>
+          </a:lnRef>
+          <a:fillRef idx="1">
+            <a:schemeClr val="lt1"/>
+          </a:fillRef>
+          <a:effectRef idx="0">
+            <a:schemeClr val="dk1"/>
+          </a:effectRef>
+          <a:fontRef idx="minor">
+            <a:schemeClr val="dk1"/>
+          </a:fontRef>
+        </p:style>
+        <p:txBody>
+          <a:bodyPr rtlCol="0" anchor="ctr"/>
+          <a:lstStyle/>
+          <a:p>
+            <a:pPr algn="ctr"/>
+            <a:r>
+              <a:rPr lang="en-US" dirty="0"/>
+              <a:t>APC n</a:t>
+            </a:r>
+          </a:p>
+        </p:txBody>
+      </p:sp>
+      <p:sp>
+        <p:nvSpPr>
+          <p:cNvPr id="10" name="Rectangle 9">
+            <a:extLst>
+              <a:ext uri="{FF2B5EF4-FFF2-40B4-BE49-F238E27FC236}">
+                <a16:creationId xmlns:a16="http://schemas.microsoft.com/office/drawing/2014/main" id="{78C0785B-E8A5-7D47-F6D0-CAF709F941F6}"/>
+              </a:ext>
+            </a:extLst>
+          </p:cNvPr>
+          <p:cNvSpPr/>
+          <p:nvPr/>
+        </p:nvSpPr>
+        <p:spPr>
+          <a:xfrm>
+            <a:off x="9624926" y="4060272"/>
+            <a:ext cx="1042373" cy="939567"/>
+          </a:xfrm>
+          <a:prstGeom prst="rect">
+            <a:avLst/>
+          </a:prstGeom>
+        </p:spPr>
+        <p:style>
+          <a:lnRef idx="2">
+            <a:schemeClr val="accent1">
+              <a:shade val="50000"/>
+            </a:schemeClr>
+          </a:lnRef>
+          <a:fillRef idx="1">
+            <a:schemeClr val="accent1"/>
+          </a:fillRef>
+          <a:effectRef idx="0">
+            <a:schemeClr val="accent1"/>
+          </a:effectRef>
+          <a:fontRef idx="minor">
+            <a:schemeClr val="lt1"/>
+          </a:fontRef>
+        </p:style>
+        <p:txBody>
+          <a:bodyPr rtlCol="0" anchor="ctr"/>
+          <a:lstStyle/>
+          <a:p>
+            <a:pPr algn="ctr"/>
+            <a:r>
+              <a:rPr lang="en-US" dirty="0"/>
+              <a:t>Dynamic Data</a:t>
+            </a:r>
+          </a:p>
+        </p:txBody>
+      </p:sp>
+      <p:sp>
+        <p:nvSpPr>
+          <p:cNvPr id="11" name="Rectangle 10">
+            <a:extLst>
+              <a:ext uri="{FF2B5EF4-FFF2-40B4-BE49-F238E27FC236}">
+                <a16:creationId xmlns:a16="http://schemas.microsoft.com/office/drawing/2014/main" id="{365DF609-FDCA-1958-E81F-85F8867E8566}"/>
+              </a:ext>
+            </a:extLst>
+          </p:cNvPr>
+          <p:cNvSpPr/>
+          <p:nvPr/>
+        </p:nvSpPr>
+        <p:spPr>
+          <a:xfrm>
+            <a:off x="10857793" y="4060272"/>
+            <a:ext cx="995840" cy="939567"/>
+          </a:xfrm>
+          <a:prstGeom prst="rect">
+            <a:avLst/>
+          </a:prstGeom>
+        </p:spPr>
+        <p:style>
+          <a:lnRef idx="2">
+            <a:schemeClr val="accent1">
+              <a:shade val="50000"/>
+            </a:schemeClr>
+          </a:lnRef>
+          <a:fillRef idx="1">
+            <a:schemeClr val="accent1"/>
+          </a:fillRef>
+          <a:effectRef idx="0">
+            <a:schemeClr val="accent1"/>
+          </a:effectRef>
+          <a:fontRef idx="minor">
+            <a:schemeClr val="lt1"/>
+          </a:fontRef>
+        </p:style>
+        <p:txBody>
+          <a:bodyPr rtlCol="0" anchor="ctr"/>
+          <a:lstStyle/>
+          <a:p>
+            <a:pPr algn="ctr"/>
+            <a:r>
+              <a:rPr lang="en-US" dirty="0"/>
+              <a:t>Dynamic Data</a:t>
+            </a:r>
+          </a:p>
+        </p:txBody>
+      </p:sp>
+      <p:sp>
+        <p:nvSpPr>
+          <p:cNvPr id="12" name="Rectangle 11">
+            <a:extLst>
+              <a:ext uri="{FF2B5EF4-FFF2-40B4-BE49-F238E27FC236}">
+                <a16:creationId xmlns:a16="http://schemas.microsoft.com/office/drawing/2014/main" id="{154A11CC-9798-24C3-2464-614BEFA6C303}"/>
+              </a:ext>
+            </a:extLst>
+          </p:cNvPr>
+          <p:cNvSpPr/>
+          <p:nvPr/>
+        </p:nvSpPr>
+        <p:spPr>
+          <a:xfrm>
+            <a:off x="3791999" y="4808440"/>
+            <a:ext cx="3973584" cy="1560353"/>
+          </a:xfrm>
+          <a:prstGeom prst="rect">
+            <a:avLst/>
+          </a:prstGeom>
+        </p:spPr>
+        <p:style>
+          <a:lnRef idx="2">
+            <a:schemeClr val="dk1"/>
+          </a:lnRef>
+          <a:fillRef idx="1">
+            <a:schemeClr val="lt1"/>
+          </a:fillRef>
+          <a:effectRef idx="0">
+            <a:schemeClr val="dk1"/>
+          </a:effectRef>
+          <a:fontRef idx="minor">
+            <a:schemeClr val="dk1"/>
+          </a:fontRef>
+        </p:style>
+        <p:txBody>
+          <a:bodyPr rtlCol="0" anchor="ctr"/>
+          <a:lstStyle/>
+          <a:p>
+            <a:pPr algn="ctr"/>
+            <a:r>
+              <a:rPr lang="en-US" dirty="0"/>
+              <a:t>Worker Service</a:t>
+            </a:r>
+          </a:p>
+        </p:txBody>
+      </p:sp>
+      <p:sp>
+        <p:nvSpPr>
+          <p:cNvPr id="14" name="Arrow: Left 13">
+            <a:extLst>
+              <a:ext uri="{FF2B5EF4-FFF2-40B4-BE49-F238E27FC236}">
+                <a16:creationId xmlns:a16="http://schemas.microsoft.com/office/drawing/2014/main" id="{00BE6485-E7B1-16E0-2D58-9B45BD5456A0}"/>
+              </a:ext>
+            </a:extLst>
+          </p:cNvPr>
+          <p:cNvSpPr/>
+          <p:nvPr/>
+        </p:nvSpPr>
+        <p:spPr>
+          <a:xfrm flipV="1">
+            <a:off x="7821854" y="5855220"/>
+            <a:ext cx="1638342" cy="114965"/>
+          </a:xfrm>
+          <a:prstGeom prst="leftArrow">
+            <a:avLst/>
+          </a:prstGeom>
+        </p:spPr>
+        <p:style>
+          <a:lnRef idx="2">
+            <a:schemeClr val="dk1"/>
+          </a:lnRef>
+          <a:fillRef idx="1">
+            <a:schemeClr val="lt1"/>
+          </a:fillRef>
+          <a:effectRef idx="0">
+            <a:schemeClr val="dk1"/>
+          </a:effectRef>
+          <a:fontRef idx="minor">
+            <a:schemeClr val="dk1"/>
+          </a:fontRef>
+        </p:style>
+        <p:txBody>
+          <a:bodyPr rtlCol="0" anchor="ctr"/>
+          <a:lstStyle/>
+          <a:p>
+            <a:pPr algn="ctr"/>
+            <a:endParaRPr lang="en-US"/>
+          </a:p>
+        </p:txBody>
+      </p:sp>
+      <p:sp>
+        <p:nvSpPr>
+          <p:cNvPr id="15" name="TextBox 14">
+            <a:extLst>
+              <a:ext uri="{FF2B5EF4-FFF2-40B4-BE49-F238E27FC236}">
+                <a16:creationId xmlns:a16="http://schemas.microsoft.com/office/drawing/2014/main" id="{B255AB5D-8EC1-B09D-11C6-2E8E565979ED}"/>
+              </a:ext>
+            </a:extLst>
+          </p:cNvPr>
+          <p:cNvSpPr txBox="1"/>
+          <p:nvPr/>
+        </p:nvSpPr>
+        <p:spPr>
+          <a:xfrm>
+            <a:off x="7821855" y="5277088"/>
+            <a:ext cx="1638339" cy="369332"/>
+          </a:xfrm>
+          <a:prstGeom prst="rect">
+            <a:avLst/>
+          </a:prstGeom>
+          <a:noFill/>
+        </p:spPr>
+        <p:txBody>
+          <a:bodyPr wrap="square" rtlCol="0">
+            <a:spAutoFit/>
+          </a:bodyPr>
+          <a:lstStyle/>
+          <a:p>
+            <a:r>
+              <a:rPr lang="en-US" dirty="0"/>
+              <a:t>Initial Request</a:t>
+            </a:r>
+          </a:p>
+        </p:txBody>
+      </p:sp>
+      <p:sp>
+        <p:nvSpPr>
+          <p:cNvPr id="20" name="Flowchart: Process 19">
+            <a:extLst>
+              <a:ext uri="{FF2B5EF4-FFF2-40B4-BE49-F238E27FC236}">
+                <a16:creationId xmlns:a16="http://schemas.microsoft.com/office/drawing/2014/main" id="{B17489CD-4A7B-6D63-DBDF-FE258BC8609D}"/>
+              </a:ext>
+            </a:extLst>
+          </p:cNvPr>
+          <p:cNvSpPr/>
+          <p:nvPr/>
+        </p:nvSpPr>
+        <p:spPr>
+          <a:xfrm>
+            <a:off x="9525353" y="3731004"/>
+            <a:ext cx="2428959" cy="2904688"/>
+          </a:xfrm>
+          <a:prstGeom prst="flowChartProcess">
+            <a:avLst/>
+          </a:prstGeom>
+          <a:noFill/>
+        </p:spPr>
+        <p:style>
+          <a:lnRef idx="2">
+            <a:schemeClr val="accent1">
+              <a:shade val="50000"/>
+            </a:schemeClr>
+          </a:lnRef>
+          <a:fillRef idx="1">
+            <a:schemeClr val="accent1"/>
+          </a:fillRef>
+          <a:effectRef idx="0">
+            <a:schemeClr val="accent1"/>
+          </a:effectRef>
+          <a:fontRef idx="minor">
+            <a:schemeClr val="lt1"/>
+          </a:fontRef>
+        </p:style>
+        <p:txBody>
+          <a:bodyPr rtlCol="0" anchor="ctr"/>
+          <a:lstStyle/>
+          <a:p>
+            <a:pPr algn="ctr"/>
+            <a:endParaRPr lang="en-US"/>
+          </a:p>
+        </p:txBody>
+      </p:sp>
+      <p:sp>
+        <p:nvSpPr>
+          <p:cNvPr id="24" name="TextBox 23">
+            <a:extLst>
+              <a:ext uri="{FF2B5EF4-FFF2-40B4-BE49-F238E27FC236}">
+                <a16:creationId xmlns:a16="http://schemas.microsoft.com/office/drawing/2014/main" id="{C90D6EA0-8B76-D0F0-D554-89C4C7C5F7EE}"/>
+              </a:ext>
+            </a:extLst>
+          </p:cNvPr>
+          <p:cNvSpPr txBox="1"/>
+          <p:nvPr/>
+        </p:nvSpPr>
+        <p:spPr>
+          <a:xfrm>
+            <a:off x="7821855" y="5961797"/>
+            <a:ext cx="1694612" cy="369332"/>
+          </a:xfrm>
+          <a:prstGeom prst="rect">
+            <a:avLst/>
+          </a:prstGeom>
+          <a:noFill/>
+        </p:spPr>
+        <p:txBody>
+          <a:bodyPr wrap="square" rtlCol="0">
+            <a:spAutoFit/>
+          </a:bodyPr>
+          <a:lstStyle/>
+          <a:p>
+            <a:r>
+              <a:rPr lang="en-US" dirty="0"/>
+              <a:t>Initial Response</a:t>
+            </a:r>
+          </a:p>
+        </p:txBody>
+      </p:sp>
+      <p:sp>
+        <p:nvSpPr>
+          <p:cNvPr id="29" name="TextBox 28">
+            <a:extLst>
+              <a:ext uri="{FF2B5EF4-FFF2-40B4-BE49-F238E27FC236}">
+                <a16:creationId xmlns:a16="http://schemas.microsoft.com/office/drawing/2014/main" id="{23906D2E-057E-14B2-A230-EF3C447B634B}"/>
+              </a:ext>
+            </a:extLst>
+          </p:cNvPr>
+          <p:cNvSpPr txBox="1"/>
+          <p:nvPr/>
+        </p:nvSpPr>
+        <p:spPr>
+          <a:xfrm>
+            <a:off x="9771294" y="3429000"/>
+            <a:ext cx="1996580" cy="369332"/>
+          </a:xfrm>
+          <a:prstGeom prst="rect">
+            <a:avLst/>
+          </a:prstGeom>
+          <a:noFill/>
+        </p:spPr>
+        <p:txBody>
+          <a:bodyPr wrap="square" rtlCol="0">
+            <a:spAutoFit/>
+          </a:bodyPr>
+          <a:lstStyle/>
+          <a:p>
+            <a:r>
+              <a:rPr lang="en-US" dirty="0"/>
+              <a:t>Data Model Object</a:t>
+            </a:r>
+          </a:p>
+        </p:txBody>
+      </p:sp>
+      <p:sp>
+        <p:nvSpPr>
+          <p:cNvPr id="30" name="Flowchart: Process 29">
+            <a:extLst>
+              <a:ext uri="{FF2B5EF4-FFF2-40B4-BE49-F238E27FC236}">
+                <a16:creationId xmlns:a16="http://schemas.microsoft.com/office/drawing/2014/main" id="{4D39115E-949B-306D-B970-DA22DF5D9E8B}"/>
+              </a:ext>
+            </a:extLst>
+          </p:cNvPr>
+          <p:cNvSpPr/>
+          <p:nvPr/>
+        </p:nvSpPr>
+        <p:spPr>
+          <a:xfrm>
+            <a:off x="6396796" y="2785145"/>
+            <a:ext cx="2701254" cy="752912"/>
+          </a:xfrm>
+          <a:prstGeom prst="flowChartProcess">
+            <a:avLst/>
+          </a:prstGeom>
+        </p:spPr>
+        <p:style>
+          <a:lnRef idx="2">
+            <a:schemeClr val="dk1"/>
+          </a:lnRef>
+          <a:fillRef idx="1">
+            <a:schemeClr val="lt1"/>
+          </a:fillRef>
+          <a:effectRef idx="0">
+            <a:schemeClr val="dk1"/>
+          </a:effectRef>
+          <a:fontRef idx="minor">
+            <a:schemeClr val="dk1"/>
+          </a:fontRef>
+        </p:style>
+        <p:txBody>
+          <a:bodyPr rtlCol="0" anchor="ctr"/>
+          <a:lstStyle/>
+          <a:p>
+            <a:pPr algn="ctr"/>
+            <a:r>
+              <a:rPr lang="en-US" dirty="0"/>
+              <a:t>Component Data Provider</a:t>
+            </a:r>
+          </a:p>
+          <a:p>
+            <a:pPr algn="ctr"/>
+            <a:r>
+              <a:rPr lang="en-US" dirty="0"/>
+              <a:t>Service</a:t>
+            </a:r>
+          </a:p>
+        </p:txBody>
+      </p:sp>
+      <p:sp>
+        <p:nvSpPr>
+          <p:cNvPr id="32" name="Flowchart: Process 31">
+            <a:extLst>
+              <a:ext uri="{FF2B5EF4-FFF2-40B4-BE49-F238E27FC236}">
+                <a16:creationId xmlns:a16="http://schemas.microsoft.com/office/drawing/2014/main" id="{1264513D-BD2F-2ECB-0359-9E54A78B1A84}"/>
+              </a:ext>
+            </a:extLst>
+          </p:cNvPr>
+          <p:cNvSpPr/>
+          <p:nvPr/>
+        </p:nvSpPr>
+        <p:spPr>
+          <a:xfrm>
+            <a:off x="6946081" y="1466526"/>
+            <a:ext cx="1967924" cy="698383"/>
+          </a:xfrm>
+          <a:prstGeom prst="flowChartProcess">
+            <a:avLst/>
+          </a:prstGeom>
+        </p:spPr>
+        <p:style>
+          <a:lnRef idx="2">
+            <a:schemeClr val="dk1"/>
+          </a:lnRef>
+          <a:fillRef idx="1">
+            <a:schemeClr val="lt1"/>
+          </a:fillRef>
+          <a:effectRef idx="0">
+            <a:schemeClr val="dk1"/>
+          </a:effectRef>
+          <a:fontRef idx="minor">
+            <a:schemeClr val="dk1"/>
+          </a:fontRef>
+        </p:style>
+        <p:txBody>
+          <a:bodyPr rtlCol="0" anchor="ctr"/>
+          <a:lstStyle/>
+          <a:p>
+            <a:pPr algn="ctr"/>
+            <a:r>
+              <a:rPr lang="en-US" dirty="0" err="1"/>
+              <a:t>Blazor</a:t>
+            </a:r>
+            <a:r>
+              <a:rPr lang="en-US" dirty="0"/>
+              <a:t> Component</a:t>
+            </a:r>
+          </a:p>
+        </p:txBody>
+      </p:sp>
+      <p:sp>
+        <p:nvSpPr>
+          <p:cNvPr id="34" name="Arrow: Up 33">
+            <a:extLst>
+              <a:ext uri="{FF2B5EF4-FFF2-40B4-BE49-F238E27FC236}">
+                <a16:creationId xmlns:a16="http://schemas.microsoft.com/office/drawing/2014/main" id="{48C8015F-6DB7-526C-8025-BBA19A2D7D50}"/>
+              </a:ext>
+            </a:extLst>
+          </p:cNvPr>
+          <p:cNvSpPr/>
+          <p:nvPr/>
+        </p:nvSpPr>
+        <p:spPr>
+          <a:xfrm>
+            <a:off x="7090971" y="2208406"/>
+            <a:ext cx="134457" cy="540877"/>
+          </a:xfrm>
+          <a:prstGeom prst="upArrow">
+            <a:avLst/>
+          </a:prstGeom>
+        </p:spPr>
+        <p:style>
+          <a:lnRef idx="2">
+            <a:schemeClr val="dk1"/>
+          </a:lnRef>
+          <a:fillRef idx="1">
+            <a:schemeClr val="lt1"/>
+          </a:fillRef>
+          <a:effectRef idx="0">
+            <a:schemeClr val="dk1"/>
+          </a:effectRef>
+          <a:fontRef idx="minor">
+            <a:schemeClr val="dk1"/>
+          </a:fontRef>
+        </p:style>
+        <p:txBody>
+          <a:bodyPr rtlCol="0" anchor="ctr"/>
+          <a:lstStyle/>
+          <a:p>
+            <a:pPr algn="ctr"/>
+            <a:endParaRPr lang="en-US"/>
+          </a:p>
+        </p:txBody>
+      </p:sp>
+      <p:sp>
+        <p:nvSpPr>
+          <p:cNvPr id="35" name="Flowchart: Process 34">
+            <a:extLst>
+              <a:ext uri="{FF2B5EF4-FFF2-40B4-BE49-F238E27FC236}">
+                <a16:creationId xmlns:a16="http://schemas.microsoft.com/office/drawing/2014/main" id="{4D5EB697-3A87-9537-6BCF-38F9A3B79AEB}"/>
+              </a:ext>
+            </a:extLst>
+          </p:cNvPr>
+          <p:cNvSpPr/>
+          <p:nvPr/>
+        </p:nvSpPr>
+        <p:spPr>
+          <a:xfrm>
+            <a:off x="5125672" y="1506027"/>
+            <a:ext cx="1275131" cy="268449"/>
+          </a:xfrm>
+          <a:prstGeom prst="flowChartProcess">
+            <a:avLst/>
+          </a:prstGeom>
+        </p:spPr>
+        <p:style>
+          <a:lnRef idx="2">
+            <a:schemeClr val="dk1"/>
+          </a:lnRef>
+          <a:fillRef idx="1">
+            <a:schemeClr val="lt1"/>
+          </a:fillRef>
+          <a:effectRef idx="0">
+            <a:schemeClr val="dk1"/>
+          </a:effectRef>
+          <a:fontRef idx="minor">
+            <a:schemeClr val="dk1"/>
+          </a:fontRef>
+        </p:style>
+        <p:txBody>
+          <a:bodyPr rtlCol="0" anchor="ctr"/>
+          <a:lstStyle/>
+          <a:p>
+            <a:pPr algn="ctr"/>
+            <a:r>
+              <a:rPr lang="en-US" dirty="0"/>
+              <a:t>Client WB 1</a:t>
+            </a:r>
+          </a:p>
+        </p:txBody>
+      </p:sp>
+      <p:sp>
+        <p:nvSpPr>
+          <p:cNvPr id="38" name="Flowchart: Process 37">
+            <a:extLst>
+              <a:ext uri="{FF2B5EF4-FFF2-40B4-BE49-F238E27FC236}">
+                <a16:creationId xmlns:a16="http://schemas.microsoft.com/office/drawing/2014/main" id="{0893C6B9-EDFF-36BC-3E31-CE18FC8EA1F9}"/>
+              </a:ext>
+            </a:extLst>
+          </p:cNvPr>
+          <p:cNvSpPr/>
+          <p:nvPr/>
+        </p:nvSpPr>
+        <p:spPr>
+          <a:xfrm>
+            <a:off x="5125672" y="1903251"/>
+            <a:ext cx="1275132" cy="268449"/>
+          </a:xfrm>
+          <a:prstGeom prst="flowChartProcess">
+            <a:avLst/>
+          </a:prstGeom>
+        </p:spPr>
+        <p:style>
+          <a:lnRef idx="2">
+            <a:schemeClr val="dk1"/>
+          </a:lnRef>
+          <a:fillRef idx="1">
+            <a:schemeClr val="lt1"/>
+          </a:fillRef>
+          <a:effectRef idx="0">
+            <a:schemeClr val="dk1"/>
+          </a:effectRef>
+          <a:fontRef idx="minor">
+            <a:schemeClr val="dk1"/>
+          </a:fontRef>
+        </p:style>
+        <p:txBody>
+          <a:bodyPr rtlCol="0" anchor="ctr"/>
+          <a:lstStyle/>
+          <a:p>
+            <a:pPr algn="ctr"/>
+            <a:r>
+              <a:rPr lang="en-US" dirty="0"/>
+              <a:t>Client WB n</a:t>
+            </a:r>
+          </a:p>
+        </p:txBody>
+      </p:sp>
+      <p:sp>
+        <p:nvSpPr>
+          <p:cNvPr id="41" name="Arrow: Left 40">
+            <a:extLst>
+              <a:ext uri="{FF2B5EF4-FFF2-40B4-BE49-F238E27FC236}">
+                <a16:creationId xmlns:a16="http://schemas.microsoft.com/office/drawing/2014/main" id="{1B2FE5F2-3305-8FA2-3C49-6467C868D806}"/>
+              </a:ext>
+            </a:extLst>
+          </p:cNvPr>
+          <p:cNvSpPr/>
+          <p:nvPr/>
+        </p:nvSpPr>
+        <p:spPr>
+          <a:xfrm>
+            <a:off x="6442746" y="1613954"/>
+            <a:ext cx="461393" cy="76095"/>
+          </a:xfrm>
+          <a:prstGeom prst="leftArrow">
+            <a:avLst/>
+          </a:prstGeom>
+        </p:spPr>
+        <p:style>
+          <a:lnRef idx="2">
+            <a:schemeClr val="dk1"/>
+          </a:lnRef>
+          <a:fillRef idx="1">
+            <a:schemeClr val="lt1"/>
+          </a:fillRef>
+          <a:effectRef idx="0">
+            <a:schemeClr val="dk1"/>
+          </a:effectRef>
+          <a:fontRef idx="minor">
+            <a:schemeClr val="dk1"/>
+          </a:fontRef>
+        </p:style>
+        <p:txBody>
+          <a:bodyPr rtlCol="0" anchor="ctr"/>
+          <a:lstStyle/>
+          <a:p>
+            <a:pPr algn="ctr"/>
+            <a:endParaRPr lang="en-US"/>
+          </a:p>
+        </p:txBody>
+      </p:sp>
+      <p:sp>
+        <p:nvSpPr>
+          <p:cNvPr id="42" name="Arrow: Left 41">
+            <a:extLst>
+              <a:ext uri="{FF2B5EF4-FFF2-40B4-BE49-F238E27FC236}">
+                <a16:creationId xmlns:a16="http://schemas.microsoft.com/office/drawing/2014/main" id="{FA8FB0AD-1479-1039-F309-EDE0CBAAED5A}"/>
+              </a:ext>
+            </a:extLst>
+          </p:cNvPr>
+          <p:cNvSpPr/>
+          <p:nvPr/>
+        </p:nvSpPr>
+        <p:spPr>
+          <a:xfrm>
+            <a:off x="6442746" y="1999847"/>
+            <a:ext cx="461393" cy="76095"/>
+          </a:xfrm>
+          <a:prstGeom prst="leftArrow">
+            <a:avLst/>
+          </a:prstGeom>
+        </p:spPr>
+        <p:style>
+          <a:lnRef idx="2">
+            <a:schemeClr val="dk1"/>
+          </a:lnRef>
+          <a:fillRef idx="1">
+            <a:schemeClr val="lt1"/>
+          </a:fillRef>
+          <a:effectRef idx="0">
+            <a:schemeClr val="dk1"/>
+          </a:effectRef>
+          <a:fontRef idx="minor">
+            <a:schemeClr val="dk1"/>
+          </a:fontRef>
+        </p:style>
+        <p:txBody>
+          <a:bodyPr rtlCol="0" anchor="ctr"/>
+          <a:lstStyle/>
+          <a:p>
+            <a:pPr algn="ctr"/>
+            <a:endParaRPr lang="en-US"/>
+          </a:p>
+        </p:txBody>
+      </p:sp>
+      <p:sp>
+        <p:nvSpPr>
+          <p:cNvPr id="4" name="Flowchart: Process 3">
+            <a:extLst>
+              <a:ext uri="{FF2B5EF4-FFF2-40B4-BE49-F238E27FC236}">
+                <a16:creationId xmlns:a16="http://schemas.microsoft.com/office/drawing/2014/main" id="{F734A7B7-F0CE-7A49-EDA8-50AC59B6FAD2}"/>
+              </a:ext>
+            </a:extLst>
+          </p:cNvPr>
+          <p:cNvSpPr/>
+          <p:nvPr/>
+        </p:nvSpPr>
+        <p:spPr>
+          <a:xfrm>
+            <a:off x="2814692" y="2785144"/>
+            <a:ext cx="2877423" cy="745277"/>
+          </a:xfrm>
+          <a:prstGeom prst="flowChartProcess">
+            <a:avLst/>
+          </a:prstGeom>
+        </p:spPr>
+        <p:style>
+          <a:lnRef idx="2">
+            <a:schemeClr val="dk1"/>
+          </a:lnRef>
+          <a:fillRef idx="1">
+            <a:schemeClr val="lt1"/>
+          </a:fillRef>
+          <a:effectRef idx="0">
+            <a:schemeClr val="dk1"/>
+          </a:effectRef>
+          <a:fontRef idx="minor">
+            <a:schemeClr val="dk1"/>
+          </a:fontRef>
+        </p:style>
+        <p:txBody>
+          <a:bodyPr rtlCol="0" anchor="ctr"/>
+          <a:lstStyle/>
+          <a:p>
+            <a:pPr algn="ctr"/>
+            <a:r>
+              <a:rPr lang="en-US" dirty="0"/>
+              <a:t>MQTT Data Provider </a:t>
+            </a:r>
+          </a:p>
+          <a:p>
+            <a:pPr algn="ctr"/>
+            <a:r>
+              <a:rPr lang="en-US" dirty="0"/>
+              <a:t>Service</a:t>
+            </a:r>
+          </a:p>
+        </p:txBody>
+      </p:sp>
+      <p:sp>
+        <p:nvSpPr>
+          <p:cNvPr id="8" name="Arrow: Up 7">
+            <a:extLst>
+              <a:ext uri="{FF2B5EF4-FFF2-40B4-BE49-F238E27FC236}">
+                <a16:creationId xmlns:a16="http://schemas.microsoft.com/office/drawing/2014/main" id="{AAF1CF5F-0785-698C-A334-3BF2EB621CC5}"/>
+              </a:ext>
+            </a:extLst>
+          </p:cNvPr>
+          <p:cNvSpPr/>
+          <p:nvPr/>
+        </p:nvSpPr>
+        <p:spPr>
+          <a:xfrm flipH="1">
+            <a:off x="3036579" y="2180652"/>
+            <a:ext cx="134456" cy="560994"/>
+          </a:xfrm>
+          <a:prstGeom prst="upArrow">
+            <a:avLst/>
+          </a:prstGeom>
+        </p:spPr>
+        <p:style>
+          <a:lnRef idx="2">
+            <a:schemeClr val="dk1"/>
+          </a:lnRef>
+          <a:fillRef idx="1">
+            <a:schemeClr val="lt1"/>
+          </a:fillRef>
+          <a:effectRef idx="0">
+            <a:schemeClr val="dk1"/>
+          </a:effectRef>
+          <a:fontRef idx="minor">
+            <a:schemeClr val="dk1"/>
+          </a:fontRef>
+        </p:style>
+        <p:txBody>
+          <a:bodyPr rtlCol="0" anchor="ctr"/>
+          <a:lstStyle/>
+          <a:p>
+            <a:pPr algn="ctr"/>
+            <a:endParaRPr lang="en-US"/>
+          </a:p>
+        </p:txBody>
+      </p:sp>
+      <p:sp>
+        <p:nvSpPr>
+          <p:cNvPr id="9" name="Flowchart: Process 8">
+            <a:extLst>
+              <a:ext uri="{FF2B5EF4-FFF2-40B4-BE49-F238E27FC236}">
+                <a16:creationId xmlns:a16="http://schemas.microsoft.com/office/drawing/2014/main" id="{C517151A-4CFE-3C37-141F-FC99BF0FD8C1}"/>
+              </a:ext>
+            </a:extLst>
+          </p:cNvPr>
+          <p:cNvSpPr/>
+          <p:nvPr/>
+        </p:nvSpPr>
+        <p:spPr>
+          <a:xfrm>
+            <a:off x="348139" y="1466527"/>
+            <a:ext cx="1661021" cy="678460"/>
+          </a:xfrm>
+          <a:prstGeom prst="flowChartProcess">
+            <a:avLst/>
+          </a:prstGeom>
+        </p:spPr>
+        <p:style>
+          <a:lnRef idx="2">
+            <a:schemeClr val="dk1"/>
+          </a:lnRef>
+          <a:fillRef idx="1">
+            <a:schemeClr val="lt1"/>
+          </a:fillRef>
+          <a:effectRef idx="0">
+            <a:schemeClr val="dk1"/>
+          </a:effectRef>
+          <a:fontRef idx="minor">
+            <a:schemeClr val="dk1"/>
+          </a:fontRef>
+        </p:style>
+        <p:txBody>
+          <a:bodyPr rtlCol="0" anchor="ctr"/>
+          <a:lstStyle/>
+          <a:p>
+            <a:pPr algn="ctr"/>
+            <a:r>
+              <a:rPr lang="en-US" dirty="0"/>
+              <a:t>MQTT Device</a:t>
+            </a:r>
+          </a:p>
+          <a:p>
+            <a:pPr algn="ctr"/>
+            <a:r>
+              <a:rPr lang="en-US" dirty="0"/>
+              <a:t>Client</a:t>
+            </a:r>
+          </a:p>
+        </p:txBody>
+      </p:sp>
+      <p:sp>
+        <p:nvSpPr>
+          <p:cNvPr id="17" name="Flowchart: Process 16">
+            <a:extLst>
+              <a:ext uri="{FF2B5EF4-FFF2-40B4-BE49-F238E27FC236}">
+                <a16:creationId xmlns:a16="http://schemas.microsoft.com/office/drawing/2014/main" id="{F5873FF5-70F8-8E15-4E25-7C0B5FEF7BBC}"/>
+              </a:ext>
+            </a:extLst>
+          </p:cNvPr>
+          <p:cNvSpPr/>
+          <p:nvPr/>
+        </p:nvSpPr>
+        <p:spPr>
+          <a:xfrm>
+            <a:off x="2801923" y="1466526"/>
+            <a:ext cx="1786854" cy="673970"/>
+          </a:xfrm>
+          <a:prstGeom prst="flowChartProcess">
+            <a:avLst/>
+          </a:prstGeom>
+        </p:spPr>
+        <p:style>
+          <a:lnRef idx="2">
+            <a:schemeClr val="dk1"/>
+          </a:lnRef>
+          <a:fillRef idx="1">
+            <a:schemeClr val="lt1"/>
+          </a:fillRef>
+          <a:effectRef idx="0">
+            <a:schemeClr val="dk1"/>
+          </a:effectRef>
+          <a:fontRef idx="minor">
+            <a:schemeClr val="dk1"/>
+          </a:fontRef>
+        </p:style>
+        <p:txBody>
+          <a:bodyPr rtlCol="0" anchor="ctr"/>
+          <a:lstStyle/>
+          <a:p>
+            <a:pPr algn="ctr"/>
+            <a:r>
+              <a:rPr lang="en-US" dirty="0"/>
+              <a:t>MQTT API</a:t>
+            </a:r>
+          </a:p>
+        </p:txBody>
+      </p:sp>
+      <p:sp>
+        <p:nvSpPr>
+          <p:cNvPr id="18" name="Arrow: Left 17">
+            <a:extLst>
+              <a:ext uri="{FF2B5EF4-FFF2-40B4-BE49-F238E27FC236}">
+                <a16:creationId xmlns:a16="http://schemas.microsoft.com/office/drawing/2014/main" id="{289293D5-4885-1354-C8FB-CFB8BD6B773D}"/>
+              </a:ext>
+            </a:extLst>
+          </p:cNvPr>
+          <p:cNvSpPr/>
+          <p:nvPr/>
+        </p:nvSpPr>
+        <p:spPr>
+          <a:xfrm>
+            <a:off x="2051102" y="1774476"/>
+            <a:ext cx="708877" cy="88884"/>
+          </a:xfrm>
+          <a:prstGeom prst="leftArrow">
+            <a:avLst/>
+          </a:prstGeom>
+        </p:spPr>
+        <p:style>
+          <a:lnRef idx="2">
+            <a:schemeClr val="dk1"/>
+          </a:lnRef>
+          <a:fillRef idx="1">
+            <a:schemeClr val="lt1"/>
+          </a:fillRef>
+          <a:effectRef idx="0">
+            <a:schemeClr val="dk1"/>
+          </a:effectRef>
+          <a:fontRef idx="minor">
+            <a:schemeClr val="dk1"/>
+          </a:fontRef>
+        </p:style>
+        <p:txBody>
+          <a:bodyPr rtlCol="0" anchor="ctr"/>
+          <a:lstStyle/>
+          <a:p>
+            <a:pPr algn="ctr"/>
+            <a:endParaRPr lang="en-US"/>
+          </a:p>
+        </p:txBody>
+      </p:sp>
+      <p:sp>
+        <p:nvSpPr>
+          <p:cNvPr id="19" name="Arrow: Left 18">
+            <a:extLst>
+              <a:ext uri="{FF2B5EF4-FFF2-40B4-BE49-F238E27FC236}">
+                <a16:creationId xmlns:a16="http://schemas.microsoft.com/office/drawing/2014/main" id="{ED1693B6-F730-513A-E772-862C7AACBCB1}"/>
+              </a:ext>
+            </a:extLst>
+          </p:cNvPr>
+          <p:cNvSpPr/>
+          <p:nvPr/>
+        </p:nvSpPr>
+        <p:spPr>
+          <a:xfrm flipV="1">
+            <a:off x="2222150" y="5066948"/>
+            <a:ext cx="1530357" cy="109059"/>
+          </a:xfrm>
+          <a:prstGeom prst="leftArrow">
+            <a:avLst/>
+          </a:prstGeom>
+        </p:spPr>
+        <p:style>
+          <a:lnRef idx="2">
+            <a:schemeClr val="dk1"/>
+          </a:lnRef>
+          <a:fillRef idx="1">
+            <a:schemeClr val="lt1"/>
+          </a:fillRef>
+          <a:effectRef idx="0">
+            <a:schemeClr val="dk1"/>
+          </a:effectRef>
+          <a:fontRef idx="minor">
+            <a:schemeClr val="dk1"/>
+          </a:fontRef>
+        </p:style>
+        <p:txBody>
+          <a:bodyPr rtlCol="0" anchor="ctr"/>
+          <a:lstStyle/>
+          <a:p>
+            <a:pPr algn="ctr"/>
+            <a:endParaRPr lang="en-US"/>
+          </a:p>
+        </p:txBody>
+      </p:sp>
+      <p:sp>
+        <p:nvSpPr>
+          <p:cNvPr id="13" name="Arrow: Right 12">
+            <a:extLst>
+              <a:ext uri="{FF2B5EF4-FFF2-40B4-BE49-F238E27FC236}">
+                <a16:creationId xmlns:a16="http://schemas.microsoft.com/office/drawing/2014/main" id="{2A67471E-E122-D295-CF99-717E9C7DD0DD}"/>
+              </a:ext>
+            </a:extLst>
+          </p:cNvPr>
+          <p:cNvSpPr/>
+          <p:nvPr/>
+        </p:nvSpPr>
+        <p:spPr>
+          <a:xfrm>
+            <a:off x="7821854" y="5177901"/>
+            <a:ext cx="1643206" cy="114965"/>
+          </a:xfrm>
+          <a:prstGeom prst="rightArrow">
+            <a:avLst/>
+          </a:prstGeom>
+        </p:spPr>
+        <p:style>
+          <a:lnRef idx="2">
+            <a:schemeClr val="dk1"/>
+          </a:lnRef>
+          <a:fillRef idx="1">
+            <a:schemeClr val="lt1"/>
+          </a:fillRef>
+          <a:effectRef idx="0">
+            <a:schemeClr val="dk1"/>
+          </a:effectRef>
+          <a:fontRef idx="minor">
+            <a:schemeClr val="dk1"/>
+          </a:fontRef>
+        </p:style>
+        <p:txBody>
+          <a:bodyPr rtlCol="0" anchor="ctr"/>
+          <a:lstStyle/>
+          <a:p>
+            <a:pPr algn="ctr"/>
+            <a:endParaRPr lang="en-US"/>
+          </a:p>
+        </p:txBody>
+      </p:sp>
+      <p:sp>
+        <p:nvSpPr>
+          <p:cNvPr id="16" name="Arrow: Down 15">
+            <a:extLst>
+              <a:ext uri="{FF2B5EF4-FFF2-40B4-BE49-F238E27FC236}">
+                <a16:creationId xmlns:a16="http://schemas.microsoft.com/office/drawing/2014/main" id="{98AFCBBA-AB74-1E84-2105-DF052AC24069}"/>
+              </a:ext>
+            </a:extLst>
+          </p:cNvPr>
+          <p:cNvSpPr/>
+          <p:nvPr/>
+        </p:nvSpPr>
+        <p:spPr>
+          <a:xfrm>
+            <a:off x="8640661" y="2200770"/>
+            <a:ext cx="134457" cy="540877"/>
+          </a:xfrm>
+          <a:prstGeom prst="downArrow">
+            <a:avLst/>
+          </a:prstGeom>
+        </p:spPr>
+        <p:style>
+          <a:lnRef idx="2">
+            <a:schemeClr val="dk1"/>
+          </a:lnRef>
+          <a:fillRef idx="1">
+            <a:schemeClr val="lt1"/>
+          </a:fillRef>
+          <a:effectRef idx="0">
+            <a:schemeClr val="dk1"/>
+          </a:effectRef>
+          <a:fontRef idx="minor">
+            <a:schemeClr val="dk1"/>
+          </a:fontRef>
+        </p:style>
+        <p:txBody>
+          <a:bodyPr rtlCol="0" anchor="ctr"/>
+          <a:lstStyle/>
+          <a:p>
+            <a:pPr algn="ctr"/>
+            <a:endParaRPr lang="en-US"/>
+          </a:p>
+        </p:txBody>
+      </p:sp>
+      <p:sp>
+        <p:nvSpPr>
+          <p:cNvPr id="22" name="Arrow: Bent-Up 21">
+            <a:extLst>
+              <a:ext uri="{FF2B5EF4-FFF2-40B4-BE49-F238E27FC236}">
+                <a16:creationId xmlns:a16="http://schemas.microsoft.com/office/drawing/2014/main" id="{4FDA9749-19C2-2130-BEB0-31CE89E10E60}"/>
+              </a:ext>
+            </a:extLst>
+          </p:cNvPr>
+          <p:cNvSpPr/>
+          <p:nvPr/>
+        </p:nvSpPr>
+        <p:spPr>
+          <a:xfrm rot="5400000">
+            <a:off x="8741508" y="3631815"/>
+            <a:ext cx="752913" cy="685692"/>
+          </a:xfrm>
+          <a:prstGeom prst="bentUpArrow">
+            <a:avLst>
+              <a:gd name="adj1" fmla="val 9475"/>
+              <a:gd name="adj2" fmla="val 8175"/>
+              <a:gd name="adj3" fmla="val 11031"/>
+            </a:avLst>
+          </a:prstGeom>
+        </p:spPr>
+        <p:style>
+          <a:lnRef idx="2">
+            <a:schemeClr val="dk1"/>
+          </a:lnRef>
+          <a:fillRef idx="1">
+            <a:schemeClr val="lt1"/>
+          </a:fillRef>
+          <a:effectRef idx="0">
+            <a:schemeClr val="dk1"/>
+          </a:effectRef>
+          <a:fontRef idx="minor">
+            <a:schemeClr val="dk1"/>
+          </a:fontRef>
+        </p:style>
+        <p:txBody>
+          <a:bodyPr rtlCol="0" anchor="ctr"/>
+          <a:lstStyle/>
+          <a:p>
+            <a:pPr algn="ctr"/>
+            <a:endParaRPr lang="en-US"/>
+          </a:p>
+        </p:txBody>
+      </p:sp>
+      <p:sp>
+        <p:nvSpPr>
+          <p:cNvPr id="45" name="Arrow: Bent-Up 44">
+            <a:extLst>
+              <a:ext uri="{FF2B5EF4-FFF2-40B4-BE49-F238E27FC236}">
+                <a16:creationId xmlns:a16="http://schemas.microsoft.com/office/drawing/2014/main" id="{181CD2B0-43B2-F638-9621-970CB084AF85}"/>
+              </a:ext>
+            </a:extLst>
+          </p:cNvPr>
+          <p:cNvSpPr/>
+          <p:nvPr/>
+        </p:nvSpPr>
+        <p:spPr>
+          <a:xfrm rot="5400000">
+            <a:off x="7044345" y="1588134"/>
+            <a:ext cx="430066" cy="4401634"/>
+          </a:xfrm>
+          <a:prstGeom prst="bentUpArrow">
+            <a:avLst>
+              <a:gd name="adj1" fmla="val 11095"/>
+              <a:gd name="adj2" fmla="val 14027"/>
+              <a:gd name="adj3" fmla="val 15656"/>
+            </a:avLst>
+          </a:prstGeom>
+        </p:spPr>
+        <p:style>
+          <a:lnRef idx="2">
+            <a:schemeClr val="dk1"/>
+          </a:lnRef>
+          <a:fillRef idx="1">
+            <a:schemeClr val="lt1"/>
+          </a:fillRef>
+          <a:effectRef idx="0">
+            <a:schemeClr val="dk1"/>
+          </a:effectRef>
+          <a:fontRef idx="minor">
+            <a:schemeClr val="dk1"/>
+          </a:fontRef>
+        </p:style>
+        <p:txBody>
+          <a:bodyPr rtlCol="0" anchor="ctr"/>
+          <a:lstStyle/>
+          <a:p>
+            <a:pPr algn="ctr"/>
+            <a:endParaRPr lang="en-US"/>
+          </a:p>
+        </p:txBody>
+      </p:sp>
+      <p:sp>
+        <p:nvSpPr>
+          <p:cNvPr id="46" name="TextBox 45">
+            <a:extLst>
+              <a:ext uri="{FF2B5EF4-FFF2-40B4-BE49-F238E27FC236}">
+                <a16:creationId xmlns:a16="http://schemas.microsoft.com/office/drawing/2014/main" id="{EE95A907-B8B5-51DE-33E9-1EE88A6BAC86}"/>
+              </a:ext>
+            </a:extLst>
+          </p:cNvPr>
+          <p:cNvSpPr txBox="1"/>
+          <p:nvPr/>
+        </p:nvSpPr>
+        <p:spPr>
+          <a:xfrm>
+            <a:off x="8881847" y="3598204"/>
+            <a:ext cx="216203" cy="261610"/>
+          </a:xfrm>
+          <a:prstGeom prst="rect">
+            <a:avLst/>
+          </a:prstGeom>
+        </p:spPr>
+        <p:style>
+          <a:lnRef idx="2">
+            <a:schemeClr val="dk1"/>
+          </a:lnRef>
+          <a:fillRef idx="1">
+            <a:schemeClr val="lt1"/>
+          </a:fillRef>
+          <a:effectRef idx="0">
+            <a:schemeClr val="dk1"/>
+          </a:effectRef>
+          <a:fontRef idx="minor">
+            <a:schemeClr val="dk1"/>
+          </a:fontRef>
+        </p:style>
+        <p:txBody>
+          <a:bodyPr wrap="square" rtlCol="0">
+            <a:spAutoFit/>
+          </a:bodyPr>
+          <a:lstStyle/>
+          <a:p>
+            <a:r>
+              <a:rPr lang="en-US" sz="1100" dirty="0"/>
+              <a:t>1</a:t>
+            </a:r>
+            <a:endParaRPr lang="en-US" sz="1000" dirty="0"/>
+          </a:p>
+        </p:txBody>
+      </p:sp>
+      <p:sp>
+        <p:nvSpPr>
+          <p:cNvPr id="47" name="TextBox 46">
+            <a:extLst>
+              <a:ext uri="{FF2B5EF4-FFF2-40B4-BE49-F238E27FC236}">
+                <a16:creationId xmlns:a16="http://schemas.microsoft.com/office/drawing/2014/main" id="{0043A2F1-33A2-B416-2311-6613BB6E83E1}"/>
+              </a:ext>
+            </a:extLst>
+          </p:cNvPr>
+          <p:cNvSpPr txBox="1"/>
+          <p:nvPr/>
+        </p:nvSpPr>
+        <p:spPr>
+          <a:xfrm>
+            <a:off x="8378935" y="3591925"/>
+            <a:ext cx="216203" cy="261610"/>
+          </a:xfrm>
+          <a:prstGeom prst="rect">
+            <a:avLst/>
+          </a:prstGeom>
+        </p:spPr>
+        <p:style>
+          <a:lnRef idx="2">
+            <a:schemeClr val="dk1"/>
+          </a:lnRef>
+          <a:fillRef idx="1">
+            <a:schemeClr val="lt1"/>
+          </a:fillRef>
+          <a:effectRef idx="0">
+            <a:schemeClr val="dk1"/>
+          </a:effectRef>
+          <a:fontRef idx="minor">
+            <a:schemeClr val="dk1"/>
+          </a:fontRef>
+        </p:style>
+        <p:txBody>
+          <a:bodyPr wrap="square" rtlCol="0">
+            <a:spAutoFit/>
+          </a:bodyPr>
+          <a:lstStyle/>
+          <a:p>
+            <a:r>
+              <a:rPr lang="en-US" sz="1100" dirty="0"/>
+              <a:t>2</a:t>
+            </a:r>
+          </a:p>
+        </p:txBody>
+      </p:sp>
+      <p:sp>
+        <p:nvSpPr>
+          <p:cNvPr id="21" name="Flowchart: Magnetic Disk 20">
+            <a:extLst>
+              <a:ext uri="{FF2B5EF4-FFF2-40B4-BE49-F238E27FC236}">
+                <a16:creationId xmlns:a16="http://schemas.microsoft.com/office/drawing/2014/main" id="{6A4A7D45-F3B5-1428-B53B-92847CE68F66}"/>
+              </a:ext>
+            </a:extLst>
+          </p:cNvPr>
+          <p:cNvSpPr/>
+          <p:nvPr/>
+        </p:nvSpPr>
+        <p:spPr>
+          <a:xfrm>
+            <a:off x="847258" y="3385456"/>
+            <a:ext cx="1329724" cy="2402948"/>
+          </a:xfrm>
+          <a:prstGeom prst="flowChartMagneticDisk">
+            <a:avLst/>
+          </a:prstGeom>
+        </p:spPr>
+        <p:style>
+          <a:lnRef idx="2">
+            <a:schemeClr val="accent1">
+              <a:shade val="50000"/>
+            </a:schemeClr>
+          </a:lnRef>
+          <a:fillRef idx="1">
+            <a:schemeClr val="accent1"/>
+          </a:fillRef>
+          <a:effectRef idx="0">
+            <a:schemeClr val="accent1"/>
+          </a:effectRef>
+          <a:fontRef idx="minor">
+            <a:schemeClr val="lt1"/>
+          </a:fontRef>
+        </p:style>
+        <p:txBody>
+          <a:bodyPr rtlCol="0" anchor="ctr"/>
+          <a:lstStyle/>
+          <a:p>
+            <a:pPr algn="ctr"/>
+            <a:endParaRPr lang="en-US" dirty="0"/>
+          </a:p>
+          <a:p>
+            <a:pPr algn="ctr"/>
+            <a:r>
+              <a:rPr lang="en-US" dirty="0"/>
+              <a:t>Data Base</a:t>
+            </a:r>
+          </a:p>
+          <a:p>
+            <a:pPr algn="ctr"/>
+            <a:endParaRPr lang="en-US" dirty="0"/>
+          </a:p>
+          <a:p>
+            <a:pPr algn="ctr"/>
+            <a:r>
+              <a:rPr lang="en-US" dirty="0"/>
+              <a:t>Dynamic Data</a:t>
+            </a:r>
+          </a:p>
+          <a:p>
+            <a:pPr algn="ctr"/>
+            <a:endParaRPr lang="en-US" dirty="0"/>
+          </a:p>
+        </p:txBody>
+      </p:sp>
+      <p:sp>
+        <p:nvSpPr>
+          <p:cNvPr id="25" name="Arrow: Bent-Up 24">
+            <a:extLst>
+              <a:ext uri="{FF2B5EF4-FFF2-40B4-BE49-F238E27FC236}">
+                <a16:creationId xmlns:a16="http://schemas.microsoft.com/office/drawing/2014/main" id="{71A44431-43F5-50F4-80DE-5FDC8B5C6017}"/>
+              </a:ext>
+            </a:extLst>
+          </p:cNvPr>
+          <p:cNvSpPr/>
+          <p:nvPr/>
+        </p:nvSpPr>
+        <p:spPr>
+          <a:xfrm>
+            <a:off x="2230078" y="3599838"/>
+            <a:ext cx="5024582" cy="647422"/>
+          </a:xfrm>
+          <a:prstGeom prst="bentUpArrow">
+            <a:avLst>
+              <a:gd name="adj1" fmla="val 9350"/>
+              <a:gd name="adj2" fmla="val 8118"/>
+              <a:gd name="adj3" fmla="val 14585"/>
+            </a:avLst>
+          </a:prstGeom>
+        </p:spPr>
+        <p:style>
+          <a:lnRef idx="2">
+            <a:schemeClr val="dk1"/>
+          </a:lnRef>
+          <a:fillRef idx="1">
+            <a:schemeClr val="lt1"/>
+          </a:fillRef>
+          <a:effectRef idx="0">
+            <a:schemeClr val="dk1"/>
+          </a:effectRef>
+          <a:fontRef idx="minor">
+            <a:schemeClr val="dk1"/>
+          </a:fontRef>
+        </p:style>
+        <p:txBody>
+          <a:bodyPr rtlCol="0" anchor="ctr"/>
+          <a:lstStyle/>
+          <a:p>
+            <a:pPr algn="ctr"/>
+            <a:endParaRPr lang="en-US"/>
+          </a:p>
+        </p:txBody>
+      </p:sp>
+      <p:sp>
+        <p:nvSpPr>
+          <p:cNvPr id="33" name="Arrow: Bent-Up 32">
+            <a:extLst>
+              <a:ext uri="{FF2B5EF4-FFF2-40B4-BE49-F238E27FC236}">
+                <a16:creationId xmlns:a16="http://schemas.microsoft.com/office/drawing/2014/main" id="{5F3C4671-81CF-B849-67B6-5B9DF36BED10}"/>
+              </a:ext>
+            </a:extLst>
+          </p:cNvPr>
+          <p:cNvSpPr/>
+          <p:nvPr/>
+        </p:nvSpPr>
+        <p:spPr>
+          <a:xfrm rot="10800000" flipV="1">
+            <a:off x="8206064" y="3581554"/>
+            <a:ext cx="1254130" cy="1117906"/>
+          </a:xfrm>
+          <a:prstGeom prst="bentUpArrow">
+            <a:avLst>
+              <a:gd name="adj1" fmla="val 6759"/>
+              <a:gd name="adj2" fmla="val 5809"/>
+              <a:gd name="adj3" fmla="val 10927"/>
+            </a:avLst>
+          </a:prstGeom>
+        </p:spPr>
+        <p:style>
+          <a:lnRef idx="2">
+            <a:schemeClr val="dk1"/>
+          </a:lnRef>
+          <a:fillRef idx="1">
+            <a:schemeClr val="lt1"/>
+          </a:fillRef>
+          <a:effectRef idx="0">
+            <a:schemeClr val="dk1"/>
+          </a:effectRef>
+          <a:fontRef idx="minor">
+            <a:schemeClr val="dk1"/>
+          </a:fontRef>
+        </p:style>
+        <p:txBody>
+          <a:bodyPr rtlCol="0" anchor="ctr"/>
+          <a:lstStyle/>
+          <a:p>
+            <a:pPr algn="ctr"/>
+            <a:endParaRPr lang="en-US"/>
+          </a:p>
+        </p:txBody>
+      </p:sp>
+      <p:sp>
+        <p:nvSpPr>
+          <p:cNvPr id="37" name="Arrow: Bent-Up 36">
+            <a:extLst>
+              <a:ext uri="{FF2B5EF4-FFF2-40B4-BE49-F238E27FC236}">
+                <a16:creationId xmlns:a16="http://schemas.microsoft.com/office/drawing/2014/main" id="{C94F6CF6-8F81-988F-D455-26750BFBB353}"/>
+              </a:ext>
+            </a:extLst>
+          </p:cNvPr>
+          <p:cNvSpPr/>
+          <p:nvPr/>
+        </p:nvSpPr>
+        <p:spPr>
+          <a:xfrm rot="16200000" flipH="1">
+            <a:off x="4563492" y="1250114"/>
+            <a:ext cx="860749" cy="5543433"/>
+          </a:xfrm>
+          <a:prstGeom prst="bentUpArrow">
+            <a:avLst>
+              <a:gd name="adj1" fmla="val 7113"/>
+              <a:gd name="adj2" fmla="val 4982"/>
+              <a:gd name="adj3" fmla="val 9041"/>
+            </a:avLst>
+          </a:prstGeom>
+        </p:spPr>
+        <p:style>
+          <a:lnRef idx="2">
+            <a:schemeClr val="dk1"/>
+          </a:lnRef>
+          <a:fillRef idx="1">
+            <a:schemeClr val="lt1"/>
+          </a:fillRef>
+          <a:effectRef idx="0">
+            <a:schemeClr val="dk1"/>
+          </a:effectRef>
+          <a:fontRef idx="minor">
+            <a:schemeClr val="dk1"/>
+          </a:fontRef>
+        </p:style>
+        <p:txBody>
+          <a:bodyPr rtlCol="0" anchor="ctr"/>
+          <a:lstStyle/>
+          <a:p>
+            <a:pPr algn="ctr"/>
+            <a:endParaRPr lang="en-US"/>
+          </a:p>
+        </p:txBody>
+      </p:sp>
+      <p:sp>
+        <p:nvSpPr>
+          <p:cNvPr id="48" name="TextBox 47">
+            <a:extLst>
+              <a:ext uri="{FF2B5EF4-FFF2-40B4-BE49-F238E27FC236}">
+                <a16:creationId xmlns:a16="http://schemas.microsoft.com/office/drawing/2014/main" id="{06B20939-4CB3-FA2E-1924-903003603F74}"/>
+              </a:ext>
+            </a:extLst>
+          </p:cNvPr>
+          <p:cNvSpPr txBox="1"/>
+          <p:nvPr/>
+        </p:nvSpPr>
+        <p:spPr>
+          <a:xfrm>
+            <a:off x="7809881" y="3601712"/>
+            <a:ext cx="216203" cy="261610"/>
+          </a:xfrm>
+          <a:prstGeom prst="rect">
+            <a:avLst/>
+          </a:prstGeom>
+        </p:spPr>
+        <p:style>
+          <a:lnRef idx="2">
+            <a:schemeClr val="dk1"/>
+          </a:lnRef>
+          <a:fillRef idx="1">
+            <a:schemeClr val="lt1"/>
+          </a:fillRef>
+          <a:effectRef idx="0">
+            <a:schemeClr val="dk1"/>
+          </a:effectRef>
+          <a:fontRef idx="minor">
+            <a:schemeClr val="dk1"/>
+          </a:fontRef>
+        </p:style>
+        <p:txBody>
+          <a:bodyPr wrap="square" rtlCol="0">
+            <a:spAutoFit/>
+          </a:bodyPr>
+          <a:lstStyle/>
+          <a:p>
+            <a:r>
+              <a:rPr lang="en-US" sz="1100" dirty="0"/>
+              <a:t>3</a:t>
+            </a:r>
+          </a:p>
+        </p:txBody>
+      </p:sp>
+      <p:sp>
+        <p:nvSpPr>
+          <p:cNvPr id="49" name="Arrow: Bent-Up 48">
+            <a:extLst>
+              <a:ext uri="{FF2B5EF4-FFF2-40B4-BE49-F238E27FC236}">
+                <a16:creationId xmlns:a16="http://schemas.microsoft.com/office/drawing/2014/main" id="{FE98F61D-65FC-BF1D-E873-B18195591BD3}"/>
+              </a:ext>
+            </a:extLst>
+          </p:cNvPr>
+          <p:cNvSpPr/>
+          <p:nvPr/>
+        </p:nvSpPr>
+        <p:spPr>
+          <a:xfrm>
+            <a:off x="2229461" y="3573919"/>
+            <a:ext cx="1329725" cy="486354"/>
+          </a:xfrm>
+          <a:prstGeom prst="bentUpArrow">
+            <a:avLst>
+              <a:gd name="adj1" fmla="val 11721"/>
+              <a:gd name="adj2" fmla="val 12860"/>
+              <a:gd name="adj3" fmla="val 18472"/>
+            </a:avLst>
+          </a:prstGeom>
+        </p:spPr>
+        <p:style>
+          <a:lnRef idx="2">
+            <a:schemeClr val="dk1"/>
+          </a:lnRef>
+          <a:fillRef idx="1">
+            <a:schemeClr val="lt1"/>
+          </a:fillRef>
+          <a:effectRef idx="0">
+            <a:schemeClr val="dk1"/>
+          </a:effectRef>
+          <a:fontRef idx="minor">
+            <a:schemeClr val="dk1"/>
+          </a:fontRef>
+        </p:style>
+        <p:txBody>
+          <a:bodyPr rtlCol="0" anchor="ctr"/>
+          <a:lstStyle/>
+          <a:p>
+            <a:pPr algn="ctr"/>
+            <a:endParaRPr lang="en-US"/>
+          </a:p>
+        </p:txBody>
+      </p:sp>
+      <p:sp>
+        <p:nvSpPr>
+          <p:cNvPr id="52" name="TextBox 51">
+            <a:extLst>
+              <a:ext uri="{FF2B5EF4-FFF2-40B4-BE49-F238E27FC236}">
+                <a16:creationId xmlns:a16="http://schemas.microsoft.com/office/drawing/2014/main" id="{B7128026-C0C3-D428-02C4-A500C8494980}"/>
+              </a:ext>
+            </a:extLst>
+          </p:cNvPr>
+          <p:cNvSpPr txBox="1"/>
+          <p:nvPr/>
+        </p:nvSpPr>
+        <p:spPr>
+          <a:xfrm>
+            <a:off x="5150140" y="3591213"/>
+            <a:ext cx="216203" cy="261610"/>
+          </a:xfrm>
+          <a:prstGeom prst="rect">
+            <a:avLst/>
+          </a:prstGeom>
+        </p:spPr>
+        <p:style>
+          <a:lnRef idx="2">
+            <a:schemeClr val="dk1"/>
+          </a:lnRef>
+          <a:fillRef idx="1">
+            <a:schemeClr val="lt1"/>
+          </a:fillRef>
+          <a:effectRef idx="0">
+            <a:schemeClr val="dk1"/>
+          </a:effectRef>
+          <a:fontRef idx="minor">
+            <a:schemeClr val="dk1"/>
+          </a:fontRef>
+        </p:style>
+        <p:txBody>
+          <a:bodyPr wrap="square" rtlCol="0">
+            <a:spAutoFit/>
+          </a:bodyPr>
+          <a:lstStyle/>
+          <a:p>
+            <a:r>
+              <a:rPr lang="en-US" sz="1100" dirty="0"/>
+              <a:t>1</a:t>
+            </a:r>
+            <a:endParaRPr lang="en-US" sz="1000" dirty="0"/>
+          </a:p>
+        </p:txBody>
+      </p:sp>
+      <p:sp>
+        <p:nvSpPr>
+          <p:cNvPr id="53" name="TextBox 52">
+            <a:extLst>
+              <a:ext uri="{FF2B5EF4-FFF2-40B4-BE49-F238E27FC236}">
+                <a16:creationId xmlns:a16="http://schemas.microsoft.com/office/drawing/2014/main" id="{6C622116-BF4F-7C9C-3500-BF5854E05B1D}"/>
+              </a:ext>
+            </a:extLst>
+          </p:cNvPr>
+          <p:cNvSpPr txBox="1"/>
+          <p:nvPr/>
+        </p:nvSpPr>
+        <p:spPr>
+          <a:xfrm>
+            <a:off x="4764674" y="3610101"/>
+            <a:ext cx="216203" cy="261610"/>
+          </a:xfrm>
+          <a:prstGeom prst="rect">
+            <a:avLst/>
+          </a:prstGeom>
+        </p:spPr>
+        <p:style>
+          <a:lnRef idx="2">
+            <a:schemeClr val="dk1"/>
+          </a:lnRef>
+          <a:fillRef idx="1">
+            <a:schemeClr val="lt1"/>
+          </a:fillRef>
+          <a:effectRef idx="0">
+            <a:schemeClr val="dk1"/>
+          </a:effectRef>
+          <a:fontRef idx="minor">
+            <a:schemeClr val="dk1"/>
+          </a:fontRef>
+        </p:style>
+        <p:txBody>
+          <a:bodyPr wrap="square" rtlCol="0">
+            <a:spAutoFit/>
+          </a:bodyPr>
+          <a:lstStyle/>
+          <a:p>
+            <a:r>
+              <a:rPr lang="en-US" sz="1100" dirty="0"/>
+              <a:t>2</a:t>
+            </a:r>
+          </a:p>
+        </p:txBody>
+      </p:sp>
+      <p:sp>
+        <p:nvSpPr>
+          <p:cNvPr id="54" name="TextBox 53">
+            <a:extLst>
+              <a:ext uri="{FF2B5EF4-FFF2-40B4-BE49-F238E27FC236}">
+                <a16:creationId xmlns:a16="http://schemas.microsoft.com/office/drawing/2014/main" id="{35CD2440-A7B7-8909-061B-A733FBF75894}"/>
+              </a:ext>
+            </a:extLst>
+          </p:cNvPr>
+          <p:cNvSpPr txBox="1"/>
+          <p:nvPr/>
+        </p:nvSpPr>
+        <p:spPr>
+          <a:xfrm>
+            <a:off x="4002673" y="3603110"/>
+            <a:ext cx="216203" cy="261610"/>
+          </a:xfrm>
+          <a:prstGeom prst="rect">
+            <a:avLst/>
+          </a:prstGeom>
+        </p:spPr>
+        <p:style>
+          <a:lnRef idx="2">
+            <a:schemeClr val="dk1"/>
+          </a:lnRef>
+          <a:fillRef idx="1">
+            <a:schemeClr val="lt1"/>
+          </a:fillRef>
+          <a:effectRef idx="0">
+            <a:schemeClr val="dk1"/>
+          </a:effectRef>
+          <a:fontRef idx="minor">
+            <a:schemeClr val="dk1"/>
+          </a:fontRef>
+        </p:style>
+        <p:txBody>
+          <a:bodyPr wrap="square" rtlCol="0">
+            <a:spAutoFit/>
+          </a:bodyPr>
+          <a:lstStyle/>
+          <a:p>
+            <a:r>
+              <a:rPr lang="en-US" sz="1100" dirty="0"/>
+              <a:t>3</a:t>
+            </a:r>
+          </a:p>
+        </p:txBody>
+      </p:sp>
+      <p:sp>
+        <p:nvSpPr>
+          <p:cNvPr id="55" name="Arrow: Up 54">
+            <a:extLst>
+              <a:ext uri="{FF2B5EF4-FFF2-40B4-BE49-F238E27FC236}">
+                <a16:creationId xmlns:a16="http://schemas.microsoft.com/office/drawing/2014/main" id="{06E51B9E-C448-15C4-DD08-3C81BD08E8A8}"/>
+              </a:ext>
+            </a:extLst>
+          </p:cNvPr>
+          <p:cNvSpPr/>
+          <p:nvPr/>
+        </p:nvSpPr>
+        <p:spPr>
+          <a:xfrm flipH="1">
+            <a:off x="4262770" y="2180652"/>
+            <a:ext cx="134455" cy="560994"/>
+          </a:xfrm>
+          <a:prstGeom prst="upArrow">
+            <a:avLst/>
+          </a:prstGeom>
+        </p:spPr>
+        <p:style>
+          <a:lnRef idx="2">
+            <a:schemeClr val="dk1"/>
+          </a:lnRef>
+          <a:fillRef idx="1">
+            <a:schemeClr val="lt1"/>
+          </a:fillRef>
+          <a:effectRef idx="0">
+            <a:schemeClr val="dk1"/>
+          </a:effectRef>
+          <a:fontRef idx="minor">
+            <a:schemeClr val="dk1"/>
+          </a:fontRef>
+        </p:style>
+        <p:txBody>
+          <a:bodyPr rtlCol="0" anchor="ctr"/>
+          <a:lstStyle/>
+          <a:p>
+            <a:pPr algn="ctr"/>
+            <a:endParaRPr lang="en-US"/>
+          </a:p>
+        </p:txBody>
+      </p:sp>
+      <p:sp>
+        <p:nvSpPr>
+          <p:cNvPr id="39" name="Arrow: Bent-Up 38">
+            <a:extLst>
+              <a:ext uri="{FF2B5EF4-FFF2-40B4-BE49-F238E27FC236}">
+                <a16:creationId xmlns:a16="http://schemas.microsoft.com/office/drawing/2014/main" id="{38579D13-992E-A808-B9FF-DEF17B30A2A2}"/>
+              </a:ext>
+            </a:extLst>
+          </p:cNvPr>
+          <p:cNvSpPr/>
+          <p:nvPr/>
+        </p:nvSpPr>
+        <p:spPr>
+          <a:xfrm rot="10800000" flipV="1">
+            <a:off x="4537747" y="3573918"/>
+            <a:ext cx="3672679" cy="1124031"/>
+          </a:xfrm>
+          <a:prstGeom prst="bentUpArrow">
+            <a:avLst>
+              <a:gd name="adj1" fmla="val 6310"/>
+              <a:gd name="adj2" fmla="val 6310"/>
+              <a:gd name="adj3" fmla="val 8367"/>
+            </a:avLst>
+          </a:prstGeom>
+        </p:spPr>
+        <p:style>
+          <a:lnRef idx="2">
+            <a:schemeClr val="dk1"/>
+          </a:lnRef>
+          <a:fillRef idx="1">
+            <a:schemeClr val="lt1"/>
+          </a:fillRef>
+          <a:effectRef idx="0">
+            <a:schemeClr val="dk1"/>
+          </a:effectRef>
+          <a:fontRef idx="minor">
+            <a:schemeClr val="dk1"/>
+          </a:fontRef>
+        </p:style>
+        <p:txBody>
+          <a:bodyPr rtlCol="0" anchor="ctr"/>
+          <a:lstStyle/>
+          <a:p>
+            <a:pPr algn="ctr"/>
+            <a:endParaRPr lang="en-US"/>
+          </a:p>
+        </p:txBody>
+      </p:sp>
+    </p:spTree>
+    <p:extLst>
+      <p:ext uri="{BB962C8B-B14F-4D97-AF65-F5344CB8AC3E}">
+        <p14:creationId xmlns:p14="http://schemas.microsoft.com/office/powerpoint/2010/main" val="1254140297"/>
+      </p:ext>
+    </p:extLst>
+  </p:cSld>
+  <p:clrMapOvr>
+    <a:masterClrMapping/>
+  </p:clrMapOvr>
+</p:sld>
+</file>
+
 <file path=ppt/theme/theme1.xml><?xml version="1.0" encoding="utf-8"?>
 <a:theme xmlns:a="http://schemas.openxmlformats.org/drawingml/2006/main" name="Office Theme">
   <a:themeElements>
@@ -6890,6 +8888,15 @@
 </file>
 
 <file path=customXml/item1.xml><?xml version="1.0" encoding="utf-8"?>
+<?mso-contentType ?>
+<FormTemplates xmlns="http://schemas.microsoft.com/sharepoint/v3/contenttype/forms">
+  <Display>DocumentLibraryForm</Display>
+  <Edit>DocumentLibraryForm</Edit>
+  <New>DocumentLibraryForm</New>
+</FormTemplates>
+</file>
+
+<file path=customXml/item2.xml><?xml version="1.0" encoding="utf-8"?>
 <ct:contentTypeSchema xmlns:ct="http://schemas.microsoft.com/office/2006/metadata/contentType" xmlns:ma="http://schemas.microsoft.com/office/2006/metadata/properties/metaAttributes" ct:_="" ma:_="" ma:contentTypeName="Dokument" ma:contentTypeID="0x010100023996653EDF394BA23888B596ABB13B" ma:contentTypeVersion="0" ma:contentTypeDescription="Ein neues Dokument erstellen." ma:contentTypeScope="" ma:versionID="6e569625767f4f619915f48d9d5fd167">
   <xsd:schema xmlns:xsd="http://www.w3.org/2001/XMLSchema" xmlns:xs="http://www.w3.org/2001/XMLSchema" xmlns:p="http://schemas.microsoft.com/office/2006/metadata/properties" targetNamespace="http://schemas.microsoft.com/office/2006/metadata/properties" ma:root="true" ma:fieldsID="855d5e9f230bd55b50e0337123bccb49">
     <xsd:element name="properties">
@@ -7003,15 +9010,6 @@
 </ct:contentTypeSchema>
 </file>
 
-<file path=customXml/item2.xml><?xml version="1.0" encoding="utf-8"?>
-<?mso-contentType ?>
-<FormTemplates xmlns="http://schemas.microsoft.com/sharepoint/v3/contenttype/forms">
-  <Display>DocumentLibraryForm</Display>
-  <Edit>DocumentLibraryForm</Edit>
-  <New>DocumentLibraryForm</New>
-</FormTemplates>
-</file>
-
 <file path=customXml/item3.xml><?xml version="1.0" encoding="utf-8"?>
 <p:properties xmlns:p="http://schemas.microsoft.com/office/2006/metadata/properties" xmlns:xsi="http://www.w3.org/2001/XMLSchema-instance" xmlns:pc="http://schemas.microsoft.com/office/infopath/2007/PartnerControls">
   <documentManagement/>
@@ -7019,6 +9017,14 @@
 </file>
 
 <file path=customXml/itemProps1.xml><?xml version="1.0" encoding="utf-8"?>
+<ds:datastoreItem xmlns:ds="http://schemas.openxmlformats.org/officeDocument/2006/customXml" ds:itemID="{30E51265-CB96-4177-9841-27C7A5C1DC3D}">
+  <ds:schemaRefs>
+    <ds:schemaRef ds:uri="http://schemas.microsoft.com/sharepoint/v3/contenttype/forms"/>
+  </ds:schemaRefs>
+</ds:datastoreItem>
+</file>
+
+<file path=customXml/itemProps2.xml><?xml version="1.0" encoding="utf-8"?>
 <ds:datastoreItem xmlns:ds="http://schemas.openxmlformats.org/officeDocument/2006/customXml" ds:itemID="{9A029B97-E4A3-4671-BCBA-4D6BD1C330C4}">
   <ds:schemaRefs>
     <ds:schemaRef ds:uri="http://schemas.microsoft.com/office/2006/metadata/contentType"/>
@@ -7030,14 +9036,6 @@
     <ds:schemaRef ds:uri="http://purl.org/dc/terms/"/>
     <ds:schemaRef ds:uri="http://schemas.microsoft.com/internal/obd"/>
     <ds:schemaRef ds:uri="http://schemas.microsoft.com/office/infopath/2007/PartnerControls"/>
-  </ds:schemaRefs>
-</ds:datastoreItem>
-</file>
-
-<file path=customXml/itemProps2.xml><?xml version="1.0" encoding="utf-8"?>
-<ds:datastoreItem xmlns:ds="http://schemas.openxmlformats.org/officeDocument/2006/customXml" ds:itemID="{30E51265-CB96-4177-9841-27C7A5C1DC3D}">
-  <ds:schemaRefs>
-    <ds:schemaRef ds:uri="http://schemas.microsoft.com/sharepoint/v3/contenttype/forms"/>
   </ds:schemaRefs>
 </ds:datastoreItem>
 </file>

</xml_diff>